<commit_message>
Adding examples of how cards might be used.
</commit_message>
<xml_diff>
--- a/bootstrap/slides/03 Bootstrap Cards.pptx
+++ b/bootstrap/slides/03 Bootstrap Cards.pptx
@@ -6,20 +6,21 @@
   </p:sldMasterIdLst>
   <p:sldIdLst>
     <p:sldId id="257" r:id="rId5"/>
-    <p:sldId id="258" r:id="rId6"/>
-    <p:sldId id="277" r:id="rId7"/>
-    <p:sldId id="278" r:id="rId8"/>
-    <p:sldId id="279" r:id="rId9"/>
-    <p:sldId id="280" r:id="rId10"/>
-    <p:sldId id="281" r:id="rId11"/>
-    <p:sldId id="282" r:id="rId12"/>
-    <p:sldId id="283" r:id="rId13"/>
-    <p:sldId id="284" r:id="rId14"/>
-    <p:sldId id="285" r:id="rId15"/>
-    <p:sldId id="286" r:id="rId16"/>
-    <p:sldId id="287" r:id="rId17"/>
-    <p:sldId id="288" r:id="rId18"/>
-    <p:sldId id="276" r:id="rId19"/>
+    <p:sldId id="289" r:id="rId6"/>
+    <p:sldId id="258" r:id="rId7"/>
+    <p:sldId id="277" r:id="rId8"/>
+    <p:sldId id="278" r:id="rId9"/>
+    <p:sldId id="279" r:id="rId10"/>
+    <p:sldId id="280" r:id="rId11"/>
+    <p:sldId id="281" r:id="rId12"/>
+    <p:sldId id="282" r:id="rId13"/>
+    <p:sldId id="283" r:id="rId14"/>
+    <p:sldId id="284" r:id="rId15"/>
+    <p:sldId id="285" r:id="rId16"/>
+    <p:sldId id="286" r:id="rId17"/>
+    <p:sldId id="287" r:id="rId18"/>
+    <p:sldId id="288" r:id="rId19"/>
+    <p:sldId id="276" r:id="rId20"/>
   </p:sldIdLst>
   <p:sldSz cx="12192000" cy="6858000"/>
   <p:notesSz cx="6858000" cy="9144000"/>
@@ -595,7 +596,7 @@
           <a:p>
             <a:fld id="{EA0C0817-A112-4847-8014-A94B7D2A4EA3}" type="datetime1">
               <a:rPr lang="en-US" smtClean="0"/>
-              <a:t>6/23/2020</a:t>
+              <a:t>6/30/2020</a:t>
             </a:fld>
             <a:endParaRPr lang="en-US" dirty="0"/>
           </a:p>
@@ -797,7 +798,7 @@
           <a:p>
             <a:fld id="{7332B432-ACDA-4023-A761-2BAB76577B62}" type="datetime1">
               <a:rPr lang="en-US" smtClean="0"/>
-              <a:t>6/23/2020</a:t>
+              <a:t>6/30/2020</a:t>
             </a:fld>
             <a:endParaRPr lang="en-US" dirty="0"/>
           </a:p>
@@ -1396,7 +1397,7 @@
           <a:p>
             <a:fld id="{D9C646AA-F36E-4540-911D-FFFC0A0EF24A}" type="datetime1">
               <a:rPr lang="en-US" smtClean="0"/>
-              <a:t>6/23/2020</a:t>
+              <a:t>6/30/2020</a:t>
             </a:fld>
             <a:endParaRPr lang="en-US" dirty="0"/>
           </a:p>
@@ -1716,7 +1717,7 @@
           <a:p>
             <a:fld id="{69186D26-FA5F-4637-B602-B7C2DC34CFD4}" type="datetime1">
               <a:rPr lang="en-US" smtClean="0"/>
-              <a:t>6/23/2020</a:t>
+              <a:t>6/30/2020</a:t>
             </a:fld>
             <a:endParaRPr lang="en-US" dirty="0"/>
           </a:p>
@@ -2153,7 +2154,7 @@
           <a:p>
             <a:fld id="{8A7F15D8-96D1-4781-BC50-CA8A088B2FE4}" type="datetime1">
               <a:rPr lang="en-US" smtClean="0"/>
-              <a:t>6/23/2020</a:t>
+              <a:t>6/30/2020</a:t>
             </a:fld>
             <a:endParaRPr lang="en-US" dirty="0"/>
           </a:p>
@@ -2271,7 +2272,7 @@
           <a:p>
             <a:fld id="{F9A96C99-B8F8-4528-BD05-0E16E943DC09}" type="datetime1">
               <a:rPr lang="en-US" smtClean="0"/>
-              <a:t>6/23/2020</a:t>
+              <a:t>6/30/2020</a:t>
             </a:fld>
             <a:endParaRPr lang="en-US" dirty="0"/>
           </a:p>
@@ -2366,7 +2367,7 @@
           <a:p>
             <a:fld id="{03636942-C211-4B28-8DBD-C953E00AF71B}" type="datetime1">
               <a:rPr lang="en-US" smtClean="0"/>
-              <a:t>6/23/2020</a:t>
+              <a:t>6/30/2020</a:t>
             </a:fld>
             <a:endParaRPr lang="en-US" dirty="0"/>
           </a:p>
@@ -2783,7 +2784,7 @@
           <a:p>
             <a:fld id="{7E8D12A6-918A-48BD-8CB9-CA713993B0EA}" type="datetime1">
               <a:rPr lang="en-US" smtClean="0"/>
-              <a:t>6/23/2020</a:t>
+              <a:t>6/30/2020</a:t>
             </a:fld>
             <a:endParaRPr lang="en-US" dirty="0"/>
           </a:p>
@@ -3045,7 +3046,7 @@
             <a:fld id="{E778CE86-875F-4587-BCF6-FA054AFC0D53}" type="datetime1">
               <a:rPr lang="en-US" smtClean="0"/>
               <a:pPr/>
-              <a:t>6/23/2020</a:t>
+              <a:t>6/30/2020</a:t>
             </a:fld>
             <a:endParaRPr lang="en-US" dirty="0"/>
           </a:p>
@@ -3561,7 +3562,7 @@
           <a:p>
             <a:fld id="{F6FA2B21-3FCD-4721-B95C-427943F61125}" type="datetime1">
               <a:rPr lang="en-US" smtClean="0"/>
-              <a:t>6/23/2020</a:t>
+              <a:t>6/30/2020</a:t>
             </a:fld>
             <a:endParaRPr lang="en-US" dirty="0"/>
           </a:p>
@@ -4311,7 +4312,7 @@
           <a:p>
             <a:r>
               <a:rPr lang="en-US"/>
-              <a:t>Colors</a:t>
+              <a:t>Text Alignment</a:t>
             </a:r>
           </a:p>
         </p:txBody>
@@ -4334,8 +4335,8 @@
         </p:nvSpPr>
         <p:spPr>
           <a:xfrm>
-            <a:off x="1066800" y="1476462"/>
-            <a:ext cx="5979952" cy="4907560"/>
+            <a:off x="1066800" y="1442906"/>
+            <a:ext cx="7624193" cy="5015780"/>
           </a:xfrm>
         </p:spPr>
         <p:txBody>
@@ -4375,7 +4376,7 @@
                 </a:highlight>
                 <a:latin typeface="Consolas" panose="020B0609020204030204" pitchFamily="49" charset="0"/>
               </a:rPr>
-              <a:t>text-white bg-primary</a:t>
+              <a:t>text-center</a:t>
             </a:r>
             <a:r>
               <a:rPr lang="en-US" sz="1600">
@@ -4433,7 +4434,7 @@
               <a:rPr lang="en-US" sz="1600">
                 <a:latin typeface="Consolas" panose="020B0609020204030204" pitchFamily="49" charset="0"/>
               </a:rPr>
-              <a:t> mb-2"&gt;Primary&lt;/h5&gt;</a:t>
+              <a:t> mb-2"&gt;Center Aligned&lt;/h5&gt;</a:t>
             </a:r>
           </a:p>
           <a:p>
@@ -4470,6 +4471,17 @@
               <a:rPr lang="en-US" sz="1600">
                 <a:latin typeface="Consolas" panose="020B0609020204030204" pitchFamily="49" charset="0"/>
               </a:rPr>
+              <a:t>    &lt;a href="#" class="btn btn-primary"&gt;Go somewhere&lt;/a&gt;</a:t>
+            </a:r>
+          </a:p>
+          <a:p>
+            <a:pPr marL="0" indent="0">
+              <a:buNone/>
+            </a:pPr>
+            <a:r>
+              <a:rPr lang="en-US" sz="1600">
+                <a:latin typeface="Consolas" panose="020B0609020204030204" pitchFamily="49" charset="0"/>
+              </a:rPr>
               <a:t>  &lt;/div&gt;</a:t>
             </a:r>
           </a:p>
@@ -4488,10 +4500,10 @@
       </p:sp>
       <p:pic>
         <p:nvPicPr>
-          <p:cNvPr id="4" name="Picture 3">
+          <p:cNvPr id="5" name="Picture 4">
             <a:extLst>
               <a:ext uri="{FF2B5EF4-FFF2-40B4-BE49-F238E27FC236}">
-                <a16:creationId xmlns:a16="http://schemas.microsoft.com/office/drawing/2014/main" id="{2C53B5D1-CF18-440D-BB16-33FAF1AB2704}"/>
+                <a16:creationId xmlns:a16="http://schemas.microsoft.com/office/drawing/2014/main" id="{E1316BB9-EE52-4930-B8AE-86307BE06858}"/>
               </a:ext>
             </a:extLst>
           </p:cNvPr>
@@ -4508,8 +4520,8 @@
         </p:blipFill>
         <p:spPr>
           <a:xfrm>
-            <a:off x="7189365" y="2257349"/>
-            <a:ext cx="4479283" cy="3987122"/>
+            <a:off x="7792894" y="1047684"/>
+            <a:ext cx="3815006" cy="4762631"/>
           </a:xfrm>
           <a:prstGeom prst="rect">
             <a:avLst/>
@@ -4519,7 +4531,7 @@
     </p:spTree>
     <p:extLst>
       <p:ext uri="{BB962C8B-B14F-4D97-AF65-F5344CB8AC3E}">
-        <p14:creationId xmlns:p14="http://schemas.microsoft.com/office/powerpoint/2010/main" val="3474588288"/>
+        <p14:creationId xmlns:p14="http://schemas.microsoft.com/office/powerpoint/2010/main" val="3960754866"/>
       </p:ext>
     </p:extLst>
   </p:cSld>
@@ -4574,7 +4586,7 @@
           <a:p>
             <a:r>
               <a:rPr lang="en-US"/>
-              <a:t>Image On Top</a:t>
+              <a:t>Colors</a:t>
             </a:r>
           </a:p>
         </p:txBody>
@@ -4629,18 +4641,7 @@
               <a:rPr lang="en-US" sz="1600">
                 <a:latin typeface="Consolas" panose="020B0609020204030204" pitchFamily="49" charset="0"/>
               </a:rPr>
-              <a:t> mb-3"&gt;</a:t>
-            </a:r>
-          </a:p>
-          <a:p>
-            <a:pPr marL="0" indent="0">
-              <a:buNone/>
-            </a:pPr>
-            <a:r>
-              <a:rPr lang="en-US" sz="1600">
-                <a:latin typeface="Consolas" panose="020B0609020204030204" pitchFamily="49" charset="0"/>
-              </a:rPr>
-              <a:t>  </a:t>
+              <a:t> mb-3 </a:t>
             </a:r>
             <a:r>
               <a:rPr lang="en-US" sz="1600">
@@ -4649,7 +4650,13 @@
                 </a:highlight>
                 <a:latin typeface="Consolas" panose="020B0609020204030204" pitchFamily="49" charset="0"/>
               </a:rPr>
-              <a:t>&lt;img class="card-img-top" src="..." /&gt;</a:t>
+              <a:t>text-white bg-primary</a:t>
+            </a:r>
+            <a:r>
+              <a:rPr lang="en-US" sz="1600">
+                <a:latin typeface="Consolas" panose="020B0609020204030204" pitchFamily="49" charset="0"/>
+              </a:rPr>
+              <a:t>"&gt;</a:t>
             </a:r>
           </a:p>
           <a:p>
@@ -4701,7 +4708,7 @@
               <a:rPr lang="en-US" sz="1600">
                 <a:latin typeface="Consolas" panose="020B0609020204030204" pitchFamily="49" charset="0"/>
               </a:rPr>
-              <a:t> mb-2"&gt;Image On Top&lt;/h5&gt;</a:t>
+              <a:t> mb-2"&gt;Primary&lt;/h5&gt;</a:t>
             </a:r>
           </a:p>
           <a:p>
@@ -4756,10 +4763,10 @@
       </p:sp>
       <p:pic>
         <p:nvPicPr>
-          <p:cNvPr id="5" name="Picture 4">
+          <p:cNvPr id="4" name="Picture 3">
             <a:extLst>
               <a:ext uri="{FF2B5EF4-FFF2-40B4-BE49-F238E27FC236}">
-                <a16:creationId xmlns:a16="http://schemas.microsoft.com/office/drawing/2014/main" id="{D691590D-D994-4256-8A4E-47F201A290F7}"/>
+                <a16:creationId xmlns:a16="http://schemas.microsoft.com/office/drawing/2014/main" id="{2C53B5D1-CF18-440D-BB16-33FAF1AB2704}"/>
               </a:ext>
             </a:extLst>
           </p:cNvPr>
@@ -4776,8 +4783,8 @@
         </p:blipFill>
         <p:spPr>
           <a:xfrm>
-            <a:off x="7800975" y="1943930"/>
-            <a:ext cx="3324225" cy="3590925"/>
+            <a:off x="7189365" y="2257349"/>
+            <a:ext cx="4479283" cy="3987122"/>
           </a:xfrm>
           <a:prstGeom prst="rect">
             <a:avLst/>
@@ -4787,7 +4794,7 @@
     </p:spTree>
     <p:extLst>
       <p:ext uri="{BB962C8B-B14F-4D97-AF65-F5344CB8AC3E}">
-        <p14:creationId xmlns:p14="http://schemas.microsoft.com/office/powerpoint/2010/main" val="3128070376"/>
+        <p14:creationId xmlns:p14="http://schemas.microsoft.com/office/powerpoint/2010/main" val="3474588288"/>
       </p:ext>
     </p:extLst>
   </p:cSld>
@@ -4842,7 +4849,7 @@
           <a:p>
             <a:r>
               <a:rPr lang="en-US"/>
-              <a:t>Image On Bottom</a:t>
+              <a:t>Image On Top</a:t>
             </a:r>
           </a:p>
         </p:txBody>
@@ -4908,6 +4915,26 @@
               <a:rPr lang="en-US" sz="1600">
                 <a:latin typeface="Consolas" panose="020B0609020204030204" pitchFamily="49" charset="0"/>
               </a:rPr>
+              <a:t>  </a:t>
+            </a:r>
+            <a:r>
+              <a:rPr lang="en-US" sz="1600">
+                <a:highlight>
+                  <a:srgbClr val="F8D22F"/>
+                </a:highlight>
+                <a:latin typeface="Consolas" panose="020B0609020204030204" pitchFamily="49" charset="0"/>
+              </a:rPr>
+              <a:t>&lt;img class="card-img-top" src="..." /&gt;</a:t>
+            </a:r>
+          </a:p>
+          <a:p>
+            <a:pPr marL="0" indent="0">
+              <a:buNone/>
+            </a:pPr>
+            <a:r>
+              <a:rPr lang="en-US" sz="1600">
+                <a:latin typeface="Consolas" panose="020B0609020204030204" pitchFamily="49" charset="0"/>
+              </a:rPr>
               <a:t>  &lt;div class="</a:t>
             </a:r>
             <a:r>
@@ -4949,7 +4976,7 @@
               <a:rPr lang="en-US" sz="1600">
                 <a:latin typeface="Consolas" panose="020B0609020204030204" pitchFamily="49" charset="0"/>
               </a:rPr>
-              <a:t> mb-2"&gt;Image On Bottom&lt;/h5&gt;</a:t>
+              <a:t> mb-2"&gt;Image On Top&lt;/h5&gt;</a:t>
             </a:r>
           </a:p>
           <a:p>
@@ -4997,26 +5024,6 @@
               <a:rPr lang="en-US" sz="1600">
                 <a:latin typeface="Consolas" panose="020B0609020204030204" pitchFamily="49" charset="0"/>
               </a:rPr>
-              <a:t>  </a:t>
-            </a:r>
-            <a:r>
-              <a:rPr lang="en-US" sz="1600">
-                <a:highlight>
-                  <a:srgbClr val="F8D22F"/>
-                </a:highlight>
-                <a:latin typeface="Consolas" panose="020B0609020204030204" pitchFamily="49" charset="0"/>
-              </a:rPr>
-              <a:t>&lt;img class="card-img-bottom" src="..." /&gt;</a:t>
-            </a:r>
-          </a:p>
-          <a:p>
-            <a:pPr marL="0" indent="0">
-              <a:buNone/>
-            </a:pPr>
-            <a:r>
-              <a:rPr lang="en-US" sz="1600">
-                <a:latin typeface="Consolas" panose="020B0609020204030204" pitchFamily="49" charset="0"/>
-              </a:rPr>
               <a:t>&lt;/div&gt;</a:t>
             </a:r>
           </a:p>
@@ -5024,10 +5031,10 @@
       </p:sp>
       <p:pic>
         <p:nvPicPr>
-          <p:cNvPr id="4" name="Picture 3">
+          <p:cNvPr id="5" name="Picture 4">
             <a:extLst>
               <a:ext uri="{FF2B5EF4-FFF2-40B4-BE49-F238E27FC236}">
-                <a16:creationId xmlns:a16="http://schemas.microsoft.com/office/drawing/2014/main" id="{E3AD0B01-5030-4C55-86C3-F0A6F91E1814}"/>
+                <a16:creationId xmlns:a16="http://schemas.microsoft.com/office/drawing/2014/main" id="{D691590D-D994-4256-8A4E-47F201A290F7}"/>
               </a:ext>
             </a:extLst>
           </p:cNvPr>
@@ -5044,8 +5051,8 @@
         </p:blipFill>
         <p:spPr>
           <a:xfrm>
-            <a:off x="7385763" y="1770914"/>
-            <a:ext cx="3400425" cy="3667125"/>
+            <a:off x="7800975" y="1943930"/>
+            <a:ext cx="3324225" cy="3590925"/>
           </a:xfrm>
           <a:prstGeom prst="rect">
             <a:avLst/>
@@ -5055,7 +5062,7 @@
     </p:spTree>
     <p:extLst>
       <p:ext uri="{BB962C8B-B14F-4D97-AF65-F5344CB8AC3E}">
-        <p14:creationId xmlns:p14="http://schemas.microsoft.com/office/powerpoint/2010/main" val="290663987"/>
+        <p14:creationId xmlns:p14="http://schemas.microsoft.com/office/powerpoint/2010/main" val="3128070376"/>
       </p:ext>
     </p:extLst>
   </p:cSld>
@@ -5100,7 +5107,7 @@
         </p:nvSpPr>
         <p:spPr>
           <a:xfrm>
-            <a:off x="580238" y="332202"/>
+            <a:off x="1066800" y="399314"/>
             <a:ext cx="10058400" cy="1371600"/>
           </a:xfrm>
         </p:spPr>
@@ -5110,7 +5117,7 @@
           <a:p>
             <a:r>
               <a:rPr lang="en-US"/>
-              <a:t>Image On Left</a:t>
+              <a:t>Image On Bottom</a:t>
             </a:r>
           </a:p>
         </p:txBody>
@@ -5133,8 +5140,8 @@
         </p:nvSpPr>
         <p:spPr>
           <a:xfrm>
-            <a:off x="580238" y="1437919"/>
-            <a:ext cx="11298573" cy="4907560"/>
+            <a:off x="1066800" y="1476462"/>
+            <a:ext cx="5979952" cy="4907560"/>
           </a:xfrm>
         </p:spPr>
         <p:txBody>
@@ -5150,7 +5157,111 @@
               <a:rPr lang="en-US" sz="1600">
                 <a:latin typeface="Consolas" panose="020B0609020204030204" pitchFamily="49" charset="0"/>
               </a:rPr>
-              <a:t>&lt;div class="card mb-3"&gt;</a:t>
+              <a:t>&lt;div class="</a:t>
+            </a:r>
+            <a:r>
+              <a:rPr lang="en-US" sz="1600">
+                <a:highlight>
+                  <a:srgbClr val="FCF7F1"/>
+                </a:highlight>
+                <a:latin typeface="Consolas" panose="020B0609020204030204" pitchFamily="49" charset="0"/>
+              </a:rPr>
+              <a:t>card</a:t>
+            </a:r>
+            <a:r>
+              <a:rPr lang="en-US" sz="1600">
+                <a:latin typeface="Consolas" panose="020B0609020204030204" pitchFamily="49" charset="0"/>
+              </a:rPr>
+              <a:t> mb-3"&gt;</a:t>
+            </a:r>
+          </a:p>
+          <a:p>
+            <a:pPr marL="0" indent="0">
+              <a:buNone/>
+            </a:pPr>
+            <a:r>
+              <a:rPr lang="en-US" sz="1600">
+                <a:latin typeface="Consolas" panose="020B0609020204030204" pitchFamily="49" charset="0"/>
+              </a:rPr>
+              <a:t>  &lt;div class="</a:t>
+            </a:r>
+            <a:r>
+              <a:rPr lang="en-US" sz="1600">
+                <a:highlight>
+                  <a:srgbClr val="FCF7F1"/>
+                </a:highlight>
+                <a:latin typeface="Consolas" panose="020B0609020204030204" pitchFamily="49" charset="0"/>
+              </a:rPr>
+              <a:t>card-body</a:t>
+            </a:r>
+            <a:r>
+              <a:rPr lang="en-US" sz="1600">
+                <a:latin typeface="Consolas" panose="020B0609020204030204" pitchFamily="49" charset="0"/>
+              </a:rPr>
+              <a:t>"&gt;</a:t>
+            </a:r>
+          </a:p>
+          <a:p>
+            <a:pPr marL="0" indent="0">
+              <a:buNone/>
+            </a:pPr>
+            <a:r>
+              <a:rPr lang="en-US" sz="1600">
+                <a:latin typeface="Consolas" panose="020B0609020204030204" pitchFamily="49" charset="0"/>
+              </a:rPr>
+              <a:t>    &lt;h5 class="</a:t>
+            </a:r>
+            <a:r>
+              <a:rPr lang="en-US" sz="1600">
+                <a:highlight>
+                  <a:srgbClr val="FCF7F1"/>
+                </a:highlight>
+                <a:latin typeface="Consolas" panose="020B0609020204030204" pitchFamily="49" charset="0"/>
+              </a:rPr>
+              <a:t>card-title</a:t>
+            </a:r>
+            <a:r>
+              <a:rPr lang="en-US" sz="1600">
+                <a:latin typeface="Consolas" panose="020B0609020204030204" pitchFamily="49" charset="0"/>
+              </a:rPr>
+              <a:t> mb-2"&gt;Image On Bottom&lt;/h5&gt;</a:t>
+            </a:r>
+          </a:p>
+          <a:p>
+            <a:pPr marL="0" indent="0">
+              <a:buNone/>
+            </a:pPr>
+            <a:r>
+              <a:rPr lang="en-US" sz="1600">
+                <a:latin typeface="Consolas" panose="020B0609020204030204" pitchFamily="49" charset="0"/>
+              </a:rPr>
+              <a:t>    &lt;p class="</a:t>
+            </a:r>
+            <a:r>
+              <a:rPr lang="en-US" sz="1600">
+                <a:highlight>
+                  <a:srgbClr val="FCF7F1"/>
+                </a:highlight>
+                <a:latin typeface="Consolas" panose="020B0609020204030204" pitchFamily="49" charset="0"/>
+              </a:rPr>
+              <a:t>card-text</a:t>
+            </a:r>
+            <a:r>
+              <a:rPr lang="en-US" sz="1600">
+                <a:latin typeface="Consolas" panose="020B0609020204030204" pitchFamily="49" charset="0"/>
+              </a:rPr>
+              <a:t>"&gt;lorem ipsum...&lt;/p&gt;</a:t>
+            </a:r>
+          </a:p>
+          <a:p>
+            <a:pPr marL="0" indent="0">
+              <a:buNone/>
+            </a:pPr>
+            <a:r>
+              <a:rPr lang="en-US" sz="1600">
+                <a:latin typeface="Consolas" panose="020B0609020204030204" pitchFamily="49" charset="0"/>
+              </a:rPr>
+              <a:t>  &lt;/div&gt;</a:t>
             </a:r>
           </a:p>
           <a:p>
@@ -5170,151 +5281,7 @@
                 </a:highlight>
                 <a:latin typeface="Consolas" panose="020B0609020204030204" pitchFamily="49" charset="0"/>
               </a:rPr>
-              <a:t>&lt;div class="row no-gutters"&gt;</a:t>
-            </a:r>
-          </a:p>
-          <a:p>
-            <a:pPr marL="0" indent="0">
-              <a:buNone/>
-            </a:pPr>
-            <a:r>
-              <a:rPr lang="en-US" sz="1600">
-                <a:latin typeface="Consolas" panose="020B0609020204030204" pitchFamily="49" charset="0"/>
-              </a:rPr>
-              <a:t>    </a:t>
-            </a:r>
-            <a:r>
-              <a:rPr lang="en-US" sz="1600">
-                <a:highlight>
-                  <a:srgbClr val="F8D22F"/>
-                </a:highlight>
-                <a:latin typeface="Consolas" panose="020B0609020204030204" pitchFamily="49" charset="0"/>
-              </a:rPr>
-              <a:t>&lt;div class="col-md-4" </a:t>
-            </a:r>
-          </a:p>
-          <a:p>
-            <a:pPr marL="0" indent="0">
-              <a:buNone/>
-            </a:pPr>
-            <a:r>
-              <a:rPr lang="en-US" sz="1600">
-                <a:latin typeface="Consolas" panose="020B0609020204030204" pitchFamily="49" charset="0"/>
-              </a:rPr>
-              <a:t>         </a:t>
-            </a:r>
-            <a:r>
-              <a:rPr lang="en-US" sz="1600">
-                <a:highlight>
-                  <a:srgbClr val="F8D22F"/>
-                </a:highlight>
-                <a:latin typeface="Consolas" panose="020B0609020204030204" pitchFamily="49" charset="0"/>
-              </a:rPr>
-              <a:t>style="background: url('...') center/cover; min-height: 300px;"&gt;&lt;/div&gt;</a:t>
-            </a:r>
-          </a:p>
-          <a:p>
-            <a:pPr marL="0" indent="0">
-              <a:buNone/>
-            </a:pPr>
-            <a:r>
-              <a:rPr lang="en-US" sz="1600">
-                <a:latin typeface="Consolas" panose="020B0609020204030204" pitchFamily="49" charset="0"/>
-              </a:rPr>
-              <a:t>    </a:t>
-            </a:r>
-            <a:r>
-              <a:rPr lang="en-US" sz="1600">
-                <a:highlight>
-                  <a:srgbClr val="F8D22F"/>
-                </a:highlight>
-                <a:latin typeface="Consolas" panose="020B0609020204030204" pitchFamily="49" charset="0"/>
-              </a:rPr>
-              <a:t>&lt;div class="col-md-8"&gt;</a:t>
-            </a:r>
-          </a:p>
-          <a:p>
-            <a:pPr marL="0" indent="0">
-              <a:buNone/>
-            </a:pPr>
-            <a:r>
-              <a:rPr lang="en-US" sz="1600">
-                <a:latin typeface="Consolas" panose="020B0609020204030204" pitchFamily="49" charset="0"/>
-              </a:rPr>
-              <a:t>      &lt;div class="card-body"&gt;</a:t>
-            </a:r>
-          </a:p>
-          <a:p>
-            <a:pPr marL="0" indent="0">
-              <a:buNone/>
-            </a:pPr>
-            <a:r>
-              <a:rPr lang="en-US" sz="1600">
-                <a:latin typeface="Consolas" panose="020B0609020204030204" pitchFamily="49" charset="0"/>
-              </a:rPr>
-              <a:t>        &lt;h5 class="card-title mb-2"&gt;Image On Left&lt;/h5&gt;</a:t>
-            </a:r>
-          </a:p>
-          <a:p>
-            <a:pPr marL="0" indent="0">
-              <a:buNone/>
-            </a:pPr>
-            <a:r>
-              <a:rPr lang="en-US" sz="1600">
-                <a:latin typeface="Consolas" panose="020B0609020204030204" pitchFamily="49" charset="0"/>
-              </a:rPr>
-              <a:t>        &lt;p class="card-text"&gt;lorem ipsum...&lt;/p&gt;</a:t>
-            </a:r>
-          </a:p>
-          <a:p>
-            <a:pPr marL="0" indent="0">
-              <a:buNone/>
-            </a:pPr>
-            <a:r>
-              <a:rPr lang="en-US" sz="1600">
-                <a:latin typeface="Consolas" panose="020B0609020204030204" pitchFamily="49" charset="0"/>
-              </a:rPr>
-              <a:t>      &lt;/div&gt;</a:t>
-            </a:r>
-          </a:p>
-          <a:p>
-            <a:pPr marL="0" indent="0">
-              <a:buNone/>
-            </a:pPr>
-            <a:r>
-              <a:rPr lang="en-US" sz="1600">
-                <a:latin typeface="Consolas" panose="020B0609020204030204" pitchFamily="49" charset="0"/>
-              </a:rPr>
-              <a:t>    </a:t>
-            </a:r>
-            <a:r>
-              <a:rPr lang="en-US" sz="1600">
-                <a:highlight>
-                  <a:srgbClr val="F8D22F"/>
-                </a:highlight>
-                <a:latin typeface="Consolas" panose="020B0609020204030204" pitchFamily="49" charset="0"/>
-              </a:rPr>
-              <a:t>&lt;/div&gt;</a:t>
-            </a:r>
-          </a:p>
-          <a:p>
-            <a:pPr marL="0" indent="0">
-              <a:buNone/>
-            </a:pPr>
-            <a:r>
-              <a:rPr lang="en-US" sz="1600">
-                <a:latin typeface="Consolas" panose="020B0609020204030204" pitchFamily="49" charset="0"/>
-              </a:rPr>
-              <a:t>  </a:t>
-            </a:r>
-            <a:r>
-              <a:rPr lang="en-US" sz="1600">
-                <a:highlight>
-                  <a:srgbClr val="F8D22F"/>
-                </a:highlight>
-                <a:latin typeface="Consolas" panose="020B0609020204030204" pitchFamily="49" charset="0"/>
-              </a:rPr>
-              <a:t>&lt;/div&gt;</a:t>
+              <a:t>&lt;img class="card-img-bottom" src="..." /&gt;</a:t>
             </a:r>
           </a:p>
           <a:p>
@@ -5332,10 +5299,10 @@
       </p:sp>
       <p:pic>
         <p:nvPicPr>
-          <p:cNvPr id="6" name="Picture 5">
+          <p:cNvPr id="4" name="Picture 3">
             <a:extLst>
               <a:ext uri="{FF2B5EF4-FFF2-40B4-BE49-F238E27FC236}">
-                <a16:creationId xmlns:a16="http://schemas.microsoft.com/office/drawing/2014/main" id="{29142F5E-6D4A-47F2-AA95-9DA17D2A49C2}"/>
+                <a16:creationId xmlns:a16="http://schemas.microsoft.com/office/drawing/2014/main" id="{E3AD0B01-5030-4C55-86C3-F0A6F91E1814}"/>
               </a:ext>
             </a:extLst>
           </p:cNvPr>
@@ -5352,8 +5319,8 @@
         </p:blipFill>
         <p:spPr>
           <a:xfrm>
-            <a:off x="7121416" y="3675355"/>
-            <a:ext cx="4490345" cy="2604720"/>
+            <a:off x="7385763" y="1770914"/>
+            <a:ext cx="3400425" cy="3667125"/>
           </a:xfrm>
           <a:prstGeom prst="rect">
             <a:avLst/>
@@ -5363,7 +5330,7 @@
     </p:spTree>
     <p:extLst>
       <p:ext uri="{BB962C8B-B14F-4D97-AF65-F5344CB8AC3E}">
-        <p14:creationId xmlns:p14="http://schemas.microsoft.com/office/powerpoint/2010/main" val="3895308491"/>
+        <p14:creationId xmlns:p14="http://schemas.microsoft.com/office/powerpoint/2010/main" val="290663987"/>
       </p:ext>
     </p:extLst>
   </p:cSld>
@@ -5418,6 +5385,314 @@
           <a:p>
             <a:r>
               <a:rPr lang="en-US"/>
+              <a:t>Image On Left</a:t>
+            </a:r>
+          </a:p>
+        </p:txBody>
+      </p:sp>
+      <p:sp>
+        <p:nvSpPr>
+          <p:cNvPr id="3" name="Content Placeholder 2">
+            <a:extLst>
+              <a:ext uri="{FF2B5EF4-FFF2-40B4-BE49-F238E27FC236}">
+                <a16:creationId xmlns:a16="http://schemas.microsoft.com/office/drawing/2014/main" id="{CE7C9B31-8275-4B78-ACEF-0803F8AF9F05}"/>
+              </a:ext>
+            </a:extLst>
+          </p:cNvPr>
+          <p:cNvSpPr>
+            <a:spLocks noGrp="1"/>
+          </p:cNvSpPr>
+          <p:nvPr>
+            <p:ph idx="1"/>
+          </p:nvPr>
+        </p:nvSpPr>
+        <p:spPr>
+          <a:xfrm>
+            <a:off x="580238" y="1437919"/>
+            <a:ext cx="11298573" cy="4907560"/>
+          </a:xfrm>
+        </p:spPr>
+        <p:txBody>
+          <a:bodyPr>
+            <a:normAutofit/>
+          </a:bodyPr>
+          <a:lstStyle/>
+          <a:p>
+            <a:pPr marL="0" indent="0">
+              <a:buNone/>
+            </a:pPr>
+            <a:r>
+              <a:rPr lang="en-US" sz="1600">
+                <a:latin typeface="Consolas" panose="020B0609020204030204" pitchFamily="49" charset="0"/>
+              </a:rPr>
+              <a:t>&lt;div class="card mb-3"&gt;</a:t>
+            </a:r>
+          </a:p>
+          <a:p>
+            <a:pPr marL="0" indent="0">
+              <a:buNone/>
+            </a:pPr>
+            <a:r>
+              <a:rPr lang="en-US" sz="1600">
+                <a:latin typeface="Consolas" panose="020B0609020204030204" pitchFamily="49" charset="0"/>
+              </a:rPr>
+              <a:t>  </a:t>
+            </a:r>
+            <a:r>
+              <a:rPr lang="en-US" sz="1600">
+                <a:highlight>
+                  <a:srgbClr val="F8D22F"/>
+                </a:highlight>
+                <a:latin typeface="Consolas" panose="020B0609020204030204" pitchFamily="49" charset="0"/>
+              </a:rPr>
+              <a:t>&lt;div class="row no-gutters"&gt;</a:t>
+            </a:r>
+          </a:p>
+          <a:p>
+            <a:pPr marL="0" indent="0">
+              <a:buNone/>
+            </a:pPr>
+            <a:r>
+              <a:rPr lang="en-US" sz="1600">
+                <a:latin typeface="Consolas" panose="020B0609020204030204" pitchFamily="49" charset="0"/>
+              </a:rPr>
+              <a:t>    </a:t>
+            </a:r>
+            <a:r>
+              <a:rPr lang="en-US" sz="1600">
+                <a:highlight>
+                  <a:srgbClr val="F8D22F"/>
+                </a:highlight>
+                <a:latin typeface="Consolas" panose="020B0609020204030204" pitchFamily="49" charset="0"/>
+              </a:rPr>
+              <a:t>&lt;div class="col-md-4" </a:t>
+            </a:r>
+          </a:p>
+          <a:p>
+            <a:pPr marL="0" indent="0">
+              <a:buNone/>
+            </a:pPr>
+            <a:r>
+              <a:rPr lang="en-US" sz="1600">
+                <a:latin typeface="Consolas" panose="020B0609020204030204" pitchFamily="49" charset="0"/>
+              </a:rPr>
+              <a:t>         </a:t>
+            </a:r>
+            <a:r>
+              <a:rPr lang="en-US" sz="1600">
+                <a:highlight>
+                  <a:srgbClr val="F8D22F"/>
+                </a:highlight>
+                <a:latin typeface="Consolas" panose="020B0609020204030204" pitchFamily="49" charset="0"/>
+              </a:rPr>
+              <a:t>style="background: url('...') center/cover; min-height: 300px;"&gt;&lt;/div&gt;</a:t>
+            </a:r>
+          </a:p>
+          <a:p>
+            <a:pPr marL="0" indent="0">
+              <a:buNone/>
+            </a:pPr>
+            <a:r>
+              <a:rPr lang="en-US" sz="1600">
+                <a:latin typeface="Consolas" panose="020B0609020204030204" pitchFamily="49" charset="0"/>
+              </a:rPr>
+              <a:t>    </a:t>
+            </a:r>
+            <a:r>
+              <a:rPr lang="en-US" sz="1600">
+                <a:highlight>
+                  <a:srgbClr val="F8D22F"/>
+                </a:highlight>
+                <a:latin typeface="Consolas" panose="020B0609020204030204" pitchFamily="49" charset="0"/>
+              </a:rPr>
+              <a:t>&lt;div class="col-md-8"&gt;</a:t>
+            </a:r>
+          </a:p>
+          <a:p>
+            <a:pPr marL="0" indent="0">
+              <a:buNone/>
+            </a:pPr>
+            <a:r>
+              <a:rPr lang="en-US" sz="1600">
+                <a:latin typeface="Consolas" panose="020B0609020204030204" pitchFamily="49" charset="0"/>
+              </a:rPr>
+              <a:t>      &lt;div class="card-body"&gt;</a:t>
+            </a:r>
+          </a:p>
+          <a:p>
+            <a:pPr marL="0" indent="0">
+              <a:buNone/>
+            </a:pPr>
+            <a:r>
+              <a:rPr lang="en-US" sz="1600">
+                <a:latin typeface="Consolas" panose="020B0609020204030204" pitchFamily="49" charset="0"/>
+              </a:rPr>
+              <a:t>        &lt;h5 class="card-title mb-2"&gt;Image On Left&lt;/h5&gt;</a:t>
+            </a:r>
+          </a:p>
+          <a:p>
+            <a:pPr marL="0" indent="0">
+              <a:buNone/>
+            </a:pPr>
+            <a:r>
+              <a:rPr lang="en-US" sz="1600">
+                <a:latin typeface="Consolas" panose="020B0609020204030204" pitchFamily="49" charset="0"/>
+              </a:rPr>
+              <a:t>        &lt;p class="card-text"&gt;lorem ipsum...&lt;/p&gt;</a:t>
+            </a:r>
+          </a:p>
+          <a:p>
+            <a:pPr marL="0" indent="0">
+              <a:buNone/>
+            </a:pPr>
+            <a:r>
+              <a:rPr lang="en-US" sz="1600">
+                <a:latin typeface="Consolas" panose="020B0609020204030204" pitchFamily="49" charset="0"/>
+              </a:rPr>
+              <a:t>      &lt;/div&gt;</a:t>
+            </a:r>
+          </a:p>
+          <a:p>
+            <a:pPr marL="0" indent="0">
+              <a:buNone/>
+            </a:pPr>
+            <a:r>
+              <a:rPr lang="en-US" sz="1600">
+                <a:latin typeface="Consolas" panose="020B0609020204030204" pitchFamily="49" charset="0"/>
+              </a:rPr>
+              <a:t>    </a:t>
+            </a:r>
+            <a:r>
+              <a:rPr lang="en-US" sz="1600">
+                <a:highlight>
+                  <a:srgbClr val="F8D22F"/>
+                </a:highlight>
+                <a:latin typeface="Consolas" panose="020B0609020204030204" pitchFamily="49" charset="0"/>
+              </a:rPr>
+              <a:t>&lt;/div&gt;</a:t>
+            </a:r>
+          </a:p>
+          <a:p>
+            <a:pPr marL="0" indent="0">
+              <a:buNone/>
+            </a:pPr>
+            <a:r>
+              <a:rPr lang="en-US" sz="1600">
+                <a:latin typeface="Consolas" panose="020B0609020204030204" pitchFamily="49" charset="0"/>
+              </a:rPr>
+              <a:t>  </a:t>
+            </a:r>
+            <a:r>
+              <a:rPr lang="en-US" sz="1600">
+                <a:highlight>
+                  <a:srgbClr val="F8D22F"/>
+                </a:highlight>
+                <a:latin typeface="Consolas" panose="020B0609020204030204" pitchFamily="49" charset="0"/>
+              </a:rPr>
+              <a:t>&lt;/div&gt;</a:t>
+            </a:r>
+          </a:p>
+          <a:p>
+            <a:pPr marL="0" indent="0">
+              <a:buNone/>
+            </a:pPr>
+            <a:r>
+              <a:rPr lang="en-US" sz="1600">
+                <a:latin typeface="Consolas" panose="020B0609020204030204" pitchFamily="49" charset="0"/>
+              </a:rPr>
+              <a:t>&lt;/div&gt;</a:t>
+            </a:r>
+          </a:p>
+        </p:txBody>
+      </p:sp>
+      <p:pic>
+        <p:nvPicPr>
+          <p:cNvPr id="6" name="Picture 5">
+            <a:extLst>
+              <a:ext uri="{FF2B5EF4-FFF2-40B4-BE49-F238E27FC236}">
+                <a16:creationId xmlns:a16="http://schemas.microsoft.com/office/drawing/2014/main" id="{29142F5E-6D4A-47F2-AA95-9DA17D2A49C2}"/>
+              </a:ext>
+            </a:extLst>
+          </p:cNvPr>
+          <p:cNvPicPr>
+            <a:picLocks noChangeAspect="1"/>
+          </p:cNvPicPr>
+          <p:nvPr/>
+        </p:nvPicPr>
+        <p:blipFill>
+          <a:blip r:embed="rId2"/>
+          <a:stretch>
+            <a:fillRect/>
+          </a:stretch>
+        </p:blipFill>
+        <p:spPr>
+          <a:xfrm>
+            <a:off x="7121416" y="3675355"/>
+            <a:ext cx="4490345" cy="2604720"/>
+          </a:xfrm>
+          <a:prstGeom prst="rect">
+            <a:avLst/>
+          </a:prstGeom>
+        </p:spPr>
+      </p:pic>
+    </p:spTree>
+    <p:extLst>
+      <p:ext uri="{BB962C8B-B14F-4D97-AF65-F5344CB8AC3E}">
+        <p14:creationId xmlns:p14="http://schemas.microsoft.com/office/powerpoint/2010/main" val="3895308491"/>
+      </p:ext>
+    </p:extLst>
+  </p:cSld>
+  <p:clrMapOvr>
+    <a:masterClrMapping/>
+  </p:clrMapOvr>
+</p:sld>
+</file>
+
+<file path=ppt/slides/slide15.xml><?xml version="1.0" encoding="utf-8"?>
+<p:sld xmlns:a="http://schemas.openxmlformats.org/drawingml/2006/main" xmlns:r="http://schemas.openxmlformats.org/officeDocument/2006/relationships" xmlns:p="http://schemas.openxmlformats.org/presentationml/2006/main">
+  <p:cSld>
+    <p:spTree>
+      <p:nvGrpSpPr>
+        <p:cNvPr id="1" name=""/>
+        <p:cNvGrpSpPr/>
+        <p:nvPr/>
+      </p:nvGrpSpPr>
+      <p:grpSpPr>
+        <a:xfrm>
+          <a:off x="0" y="0"/>
+          <a:ext cx="0" cy="0"/>
+          <a:chOff x="0" y="0"/>
+          <a:chExt cx="0" cy="0"/>
+        </a:xfrm>
+      </p:grpSpPr>
+      <p:sp>
+        <p:nvSpPr>
+          <p:cNvPr id="2" name="Title 1">
+            <a:extLst>
+              <a:ext uri="{FF2B5EF4-FFF2-40B4-BE49-F238E27FC236}">
+                <a16:creationId xmlns:a16="http://schemas.microsoft.com/office/drawing/2014/main" id="{DED3F4E7-3678-4F28-8862-8D69044471C8}"/>
+              </a:ext>
+            </a:extLst>
+          </p:cNvPr>
+          <p:cNvSpPr>
+            <a:spLocks noGrp="1"/>
+          </p:cNvSpPr>
+          <p:nvPr>
+            <p:ph type="title"/>
+          </p:nvPr>
+        </p:nvSpPr>
+        <p:spPr>
+          <a:xfrm>
+            <a:off x="580238" y="332202"/>
+            <a:ext cx="10058400" cy="1371600"/>
+          </a:xfrm>
+        </p:spPr>
+        <p:txBody>
+          <a:bodyPr/>
+          <a:lstStyle/>
+          <a:p>
+            <a:r>
+              <a:rPr lang="en-US"/>
               <a:t>Image On Right</a:t>
             </a:r>
           </a:p>
@@ -5708,7 +5983,7 @@
 </p:sld>
 </file>
 
-<file path=ppt/slides/slide15.xml><?xml version="1.0" encoding="utf-8"?>
+<file path=ppt/slides/slide16.xml><?xml version="1.0" encoding="utf-8"?>
 <p:sld xmlns:a="http://schemas.openxmlformats.org/drawingml/2006/main" xmlns:r="http://schemas.openxmlformats.org/officeDocument/2006/relationships" xmlns:p="http://schemas.openxmlformats.org/presentationml/2006/main">
   <p:cSld>
     <p:spTree>
@@ -5842,7 +6117,7 @@
           <p:cNvPr id="2" name="Title 1">
             <a:extLst>
               <a:ext uri="{FF2B5EF4-FFF2-40B4-BE49-F238E27FC236}">
-                <a16:creationId xmlns:a16="http://schemas.microsoft.com/office/drawing/2014/main" id="{7A5FD0E3-36E7-4A64-B00F-05FD823C1BDB}"/>
+                <a16:creationId xmlns:a16="http://schemas.microsoft.com/office/drawing/2014/main" id="{51CE1461-ED0B-4308-BC34-BAF53FF78B45}"/>
               </a:ext>
             </a:extLst>
           </p:cNvPr>
@@ -5860,7 +6135,7 @@
           <a:p>
             <a:r>
               <a:rPr lang="en-US"/>
-              <a:t>Cards</a:t>
+              <a:t>What is a card?</a:t>
             </a:r>
           </a:p>
         </p:txBody>
@@ -5870,7 +6145,7 @@
           <p:cNvPr id="3" name="Content Placeholder 2">
             <a:extLst>
               <a:ext uri="{FF2B5EF4-FFF2-40B4-BE49-F238E27FC236}">
-                <a16:creationId xmlns:a16="http://schemas.microsoft.com/office/drawing/2014/main" id="{43ADE9B3-0BAC-44C0-B27B-1A4504E1C890}"/>
+                <a16:creationId xmlns:a16="http://schemas.microsoft.com/office/drawing/2014/main" id="{463696F5-7304-4D31-84F2-CF30DA5E1F92}"/>
               </a:ext>
             </a:extLst>
           </p:cNvPr>
@@ -5881,16 +6156,9 @@
             <p:ph idx="1"/>
           </p:nvPr>
         </p:nvSpPr>
-        <p:spPr>
-          <a:xfrm>
-            <a:off x="1066800" y="1736521"/>
-            <a:ext cx="10058400" cy="3889052"/>
-          </a:xfrm>
-        </p:spPr>
-        <p:txBody>
-          <a:bodyPr>
-            <a:normAutofit/>
-          </a:bodyPr>
+        <p:spPr/>
+        <p:txBody>
+          <a:bodyPr/>
           <a:lstStyle/>
           <a:p>
             <a:pPr marL="0" indent="0">
@@ -5898,15 +6166,14 @@
             </a:pPr>
             <a:r>
               <a:rPr lang="en-US" sz="2400"/>
-              <a:t>Bootstrap’s cards provide a flexible and extensible container with multiple variants and options.</a:t>
-            </a:r>
-            <a:endParaRPr lang="en-US" sz="1600"/>
-          </a:p>
-          <a:p>
-            <a:pPr marL="0" indent="0">
-              <a:buNone/>
-            </a:pPr>
-            <a:endParaRPr lang="en-US" sz="1600"/>
+              <a:t>Cards are used to represent items in a list/array.</a:t>
+            </a:r>
+          </a:p>
+          <a:p>
+            <a:pPr marL="0" indent="0">
+              <a:buNone/>
+            </a:pPr>
+            <a:endParaRPr lang="en-US" sz="1800"/>
           </a:p>
           <a:p>
             <a:pPr>
@@ -5914,8 +6181,8 @@
               <a:buChar char="o"/>
             </a:pPr>
             <a:r>
-              <a:rPr lang="en-US" sz="1600"/>
-              <a:t>Cards are flexible and extensible.</a:t>
+              <a:rPr lang="en-US" sz="1800"/>
+              <a:t>twitter: tweets</a:t>
             </a:r>
           </a:p>
           <a:p>
@@ -5924,8 +6191,8 @@
               <a:buChar char="o"/>
             </a:pPr>
             <a:r>
-              <a:rPr lang="en-US" sz="1600"/>
-              <a:t>Cards may include optional headers and footers.</a:t>
+              <a:rPr lang="en-US" sz="1800"/>
+              <a:t>pinterest: images</a:t>
             </a:r>
           </a:p>
           <a:p>
@@ -5934,8 +6201,8 @@
               <a:buChar char="o"/>
             </a:pPr>
             <a:r>
-              <a:rPr lang="en-US" sz="1600"/>
-              <a:t>Cards can contain a wide variety of content.</a:t>
+              <a:rPr lang="en-US" sz="1800"/>
+              <a:t>youtube: videos</a:t>
             </a:r>
           </a:p>
           <a:p>
@@ -5944,63 +6211,47 @@
               <a:buChar char="o"/>
             </a:pPr>
             <a:r>
-              <a:rPr lang="en-US" sz="1600"/>
-              <a:t>Cards have a wide variety of display options.</a:t>
-            </a:r>
-          </a:p>
-        </p:txBody>
-      </p:sp>
-      <p:sp>
-        <p:nvSpPr>
-          <p:cNvPr id="4" name="Rectangle 3">
-            <a:extLst>
-              <a:ext uri="{FF2B5EF4-FFF2-40B4-BE49-F238E27FC236}">
-                <a16:creationId xmlns:a16="http://schemas.microsoft.com/office/drawing/2014/main" id="{1C36D350-743D-4A5F-95D5-F6444D27A886}"/>
-              </a:ext>
-            </a:extLst>
-          </p:cNvPr>
-          <p:cNvSpPr/>
-          <p:nvPr/>
-        </p:nvSpPr>
-        <p:spPr>
-          <a:xfrm>
-            <a:off x="1066800" y="5923018"/>
-            <a:ext cx="10058400" cy="523220"/>
-          </a:xfrm>
-          <a:prstGeom prst="rect">
-            <a:avLst/>
-          </a:prstGeom>
-        </p:spPr>
-        <p:txBody>
-          <a:bodyPr wrap="square">
-            <a:spAutoFit/>
-          </a:bodyPr>
-          <a:lstStyle/>
-          <a:p>
-            <a:r>
-              <a:rPr lang="en-US" sz="1400" b="1"/>
-              <a:t>Sources</a:t>
-            </a:r>
-          </a:p>
-          <a:p>
-            <a:r>
-              <a:rPr lang="en-US" sz="1400">
-                <a:hlinkClick r:id="rId2"/>
-              </a:rPr>
-              <a:t>https://getbootstrap.com/docs/4.5/components/card/</a:t>
-            </a:r>
-            <a:endParaRPr lang="en-US" sz="1400" b="1">
-              <a:solidFill>
-                <a:srgbClr val="00B0F0"/>
-              </a:solidFill>
-            </a:endParaRPr>
+              <a:rPr lang="en-US" sz="1800"/>
+              <a:t>yelp: places</a:t>
+            </a:r>
+          </a:p>
+          <a:p>
+            <a:pPr>
+              <a:buFont typeface="Courier New" panose="02070309020205020404" pitchFamily="49" charset="0"/>
+              <a:buChar char="o"/>
+            </a:pPr>
+            <a:r>
+              <a:rPr lang="en-US" sz="1800"/>
+              <a:t>social media: posts and comments</a:t>
+            </a:r>
+          </a:p>
+          <a:p>
+            <a:pPr>
+              <a:buFont typeface="Courier New" panose="02070309020205020404" pitchFamily="49" charset="0"/>
+              <a:buChar char="o"/>
+            </a:pPr>
+            <a:r>
+              <a:rPr lang="en-US" sz="1800"/>
+              <a:t>news media: articles</a:t>
+            </a:r>
+          </a:p>
+          <a:p>
+            <a:pPr>
+              <a:buFont typeface="Courier New" panose="02070309020205020404" pitchFamily="49" charset="0"/>
+              <a:buChar char="o"/>
+            </a:pPr>
+            <a:r>
+              <a:rPr lang="en-US" sz="1800"/>
+              <a:t>ecommerce: products</a:t>
+            </a:r>
+            <a:endParaRPr lang="en-US"/>
           </a:p>
         </p:txBody>
       </p:sp>
     </p:spTree>
     <p:extLst>
       <p:ext uri="{BB962C8B-B14F-4D97-AF65-F5344CB8AC3E}">
-        <p14:creationId xmlns:p14="http://schemas.microsoft.com/office/powerpoint/2010/main" val="2847389661"/>
+        <p14:creationId xmlns:p14="http://schemas.microsoft.com/office/powerpoint/2010/main" val="1171739617"/>
       </p:ext>
     </p:extLst>
   </p:cSld>
@@ -6032,7 +6283,7 @@
           <p:cNvPr id="2" name="Title 1">
             <a:extLst>
               <a:ext uri="{FF2B5EF4-FFF2-40B4-BE49-F238E27FC236}">
-                <a16:creationId xmlns:a16="http://schemas.microsoft.com/office/drawing/2014/main" id="{DED3F4E7-3678-4F28-8862-8D69044471C8}"/>
+                <a16:creationId xmlns:a16="http://schemas.microsoft.com/office/drawing/2014/main" id="{7A5FD0E3-36E7-4A64-B00F-05FD823C1BDB}"/>
               </a:ext>
             </a:extLst>
           </p:cNvPr>
@@ -6050,7 +6301,7 @@
           <a:p>
             <a:r>
               <a:rPr lang="en-US"/>
-              <a:t>A Basic Card</a:t>
+              <a:t>Cards</a:t>
             </a:r>
           </a:p>
         </p:txBody>
@@ -6060,7 +6311,7 @@
           <p:cNvPr id="3" name="Content Placeholder 2">
             <a:extLst>
               <a:ext uri="{FF2B5EF4-FFF2-40B4-BE49-F238E27FC236}">
-                <a16:creationId xmlns:a16="http://schemas.microsoft.com/office/drawing/2014/main" id="{CE7C9B31-8275-4B78-ACEF-0803F8AF9F05}"/>
+                <a16:creationId xmlns:a16="http://schemas.microsoft.com/office/drawing/2014/main" id="{43ADE9B3-0BAC-44C0-B27B-1A4504E1C890}"/>
               </a:ext>
             </a:extLst>
           </p:cNvPr>
@@ -6073,8 +6324,8 @@
         </p:nvSpPr>
         <p:spPr>
           <a:xfrm>
-            <a:off x="1066800" y="2103120"/>
-            <a:ext cx="5029200" cy="3114832"/>
+            <a:off x="1066800" y="1736521"/>
+            <a:ext cx="10058400" cy="3889052"/>
           </a:xfrm>
         </p:spPr>
         <p:txBody>
@@ -6087,137 +6338,110 @@
               <a:buNone/>
             </a:pPr>
             <a:r>
-              <a:rPr lang="en-US" sz="1600">
-                <a:latin typeface="Consolas" panose="020B0609020204030204" pitchFamily="49" charset="0"/>
-              </a:rPr>
-              <a:t>&lt;div class="</a:t>
-            </a:r>
-            <a:r>
-              <a:rPr lang="en-US" sz="1600">
-                <a:highlight>
-                  <a:srgbClr val="FCF7F1"/>
-                </a:highlight>
-                <a:latin typeface="Consolas" panose="020B0609020204030204" pitchFamily="49" charset="0"/>
-              </a:rPr>
-              <a:t>card</a:t>
-            </a:r>
-            <a:r>
-              <a:rPr lang="en-US" sz="1600">
-                <a:latin typeface="Consolas" panose="020B0609020204030204" pitchFamily="49" charset="0"/>
-              </a:rPr>
-              <a:t> mb-3"&gt;</a:t>
-            </a:r>
-          </a:p>
-          <a:p>
-            <a:pPr marL="0" indent="0">
-              <a:buNone/>
-            </a:pPr>
-            <a:r>
-              <a:rPr lang="en-US" sz="1600">
-                <a:latin typeface="Consolas" panose="020B0609020204030204" pitchFamily="49" charset="0"/>
-              </a:rPr>
-              <a:t>  &lt;div class="</a:t>
-            </a:r>
-            <a:r>
-              <a:rPr lang="en-US" sz="1600">
-                <a:highlight>
-                  <a:srgbClr val="FCF7F1"/>
-                </a:highlight>
-                <a:latin typeface="Consolas" panose="020B0609020204030204" pitchFamily="49" charset="0"/>
-              </a:rPr>
-              <a:t>card-body</a:t>
-            </a:r>
-            <a:r>
-              <a:rPr lang="en-US" sz="1600">
-                <a:latin typeface="Consolas" panose="020B0609020204030204" pitchFamily="49" charset="0"/>
-              </a:rPr>
-              <a:t>"&gt;</a:t>
-            </a:r>
-          </a:p>
-          <a:p>
-            <a:pPr marL="0" indent="0">
-              <a:buNone/>
-            </a:pPr>
-            <a:r>
-              <a:rPr lang="en-US" sz="1600">
-                <a:latin typeface="Consolas" panose="020B0609020204030204" pitchFamily="49" charset="0"/>
-              </a:rPr>
-              <a:t>    &lt;p class="</a:t>
-            </a:r>
-            <a:r>
-              <a:rPr lang="en-US" sz="1600">
-                <a:highlight>
-                  <a:srgbClr val="FCF7F1"/>
-                </a:highlight>
-                <a:latin typeface="Consolas" panose="020B0609020204030204" pitchFamily="49" charset="0"/>
-              </a:rPr>
-              <a:t>card-text</a:t>
-            </a:r>
-            <a:r>
-              <a:rPr lang="en-US" sz="1600">
-                <a:latin typeface="Consolas" panose="020B0609020204030204" pitchFamily="49" charset="0"/>
-              </a:rPr>
-              <a:t>"&gt;lorem ipsum...&lt;/p&gt;</a:t>
-            </a:r>
-          </a:p>
-          <a:p>
-            <a:pPr marL="0" indent="0">
-              <a:buNone/>
-            </a:pPr>
-            <a:r>
-              <a:rPr lang="en-US" sz="1600">
-                <a:latin typeface="Consolas" panose="020B0609020204030204" pitchFamily="49" charset="0"/>
-              </a:rPr>
-              <a:t>  &lt;/div&gt;</a:t>
-            </a:r>
-          </a:p>
-          <a:p>
-            <a:pPr marL="0" indent="0">
-              <a:buNone/>
-            </a:pPr>
-            <a:r>
-              <a:rPr lang="en-US" sz="1600">
-                <a:latin typeface="Consolas" panose="020B0609020204030204" pitchFamily="49" charset="0"/>
-              </a:rPr>
-              <a:t>&lt;/div&gt;</a:t>
-            </a:r>
-          </a:p>
-        </p:txBody>
-      </p:sp>
-      <p:pic>
-        <p:nvPicPr>
-          <p:cNvPr id="4" name="Picture 3">
+              <a:rPr lang="en-US" sz="2400"/>
+              <a:t>Bootstrap’s cards provide a flexible and extensible container with multiple variants and options.</a:t>
+            </a:r>
+            <a:endParaRPr lang="en-US" sz="1600"/>
+          </a:p>
+          <a:p>
+            <a:pPr marL="0" indent="0">
+              <a:buNone/>
+            </a:pPr>
+            <a:endParaRPr lang="en-US" sz="1600"/>
+          </a:p>
+          <a:p>
+            <a:pPr>
+              <a:buFont typeface="Courier New" panose="02070309020205020404" pitchFamily="49" charset="0"/>
+              <a:buChar char="o"/>
+            </a:pPr>
+            <a:r>
+              <a:rPr lang="en-US" sz="1600"/>
+              <a:t>Cards are flexible and extensible.</a:t>
+            </a:r>
+          </a:p>
+          <a:p>
+            <a:pPr>
+              <a:buFont typeface="Courier New" panose="02070309020205020404" pitchFamily="49" charset="0"/>
+              <a:buChar char="o"/>
+            </a:pPr>
+            <a:r>
+              <a:rPr lang="en-US" sz="1600"/>
+              <a:t>Cards may include optional headers and footers.</a:t>
+            </a:r>
+          </a:p>
+          <a:p>
+            <a:pPr>
+              <a:buFont typeface="Courier New" panose="02070309020205020404" pitchFamily="49" charset="0"/>
+              <a:buChar char="o"/>
+            </a:pPr>
+            <a:r>
+              <a:rPr lang="en-US" sz="1600"/>
+              <a:t>Cards can contain a wide variety of content.</a:t>
+            </a:r>
+          </a:p>
+          <a:p>
+            <a:pPr>
+              <a:buFont typeface="Courier New" panose="02070309020205020404" pitchFamily="49" charset="0"/>
+              <a:buChar char="o"/>
+            </a:pPr>
+            <a:r>
+              <a:rPr lang="en-US" sz="1600"/>
+              <a:t>Cards have a wide variety of display options.</a:t>
+            </a:r>
+          </a:p>
+        </p:txBody>
+      </p:sp>
+      <p:sp>
+        <p:nvSpPr>
+          <p:cNvPr id="4" name="Rectangle 3">
             <a:extLst>
               <a:ext uri="{FF2B5EF4-FFF2-40B4-BE49-F238E27FC236}">
-                <a16:creationId xmlns:a16="http://schemas.microsoft.com/office/drawing/2014/main" id="{8B803263-7E71-4721-9916-A1C37A4A729E}"/>
+                <a16:creationId xmlns:a16="http://schemas.microsoft.com/office/drawing/2014/main" id="{1C36D350-743D-4A5F-95D5-F6444D27A886}"/>
               </a:ext>
             </a:extLst>
           </p:cNvPr>
-          <p:cNvPicPr>
-            <a:picLocks noChangeAspect="1"/>
-          </p:cNvPicPr>
+          <p:cNvSpPr/>
           <p:nvPr/>
-        </p:nvPicPr>
-        <p:blipFill>
-          <a:blip r:embed="rId2"/>
-          <a:stretch>
-            <a:fillRect/>
-          </a:stretch>
-        </p:blipFill>
-        <p:spPr>
-          <a:xfrm>
-            <a:off x="5693329" y="3993203"/>
-            <a:ext cx="4486275" cy="1019175"/>
+        </p:nvSpPr>
+        <p:spPr>
+          <a:xfrm>
+            <a:off x="1066800" y="5923018"/>
+            <a:ext cx="10058400" cy="523220"/>
           </a:xfrm>
           <a:prstGeom prst="rect">
             <a:avLst/>
           </a:prstGeom>
         </p:spPr>
-      </p:pic>
+        <p:txBody>
+          <a:bodyPr wrap="square">
+            <a:spAutoFit/>
+          </a:bodyPr>
+          <a:lstStyle/>
+          <a:p>
+            <a:r>
+              <a:rPr lang="en-US" sz="1400" b="1"/>
+              <a:t>Sources</a:t>
+            </a:r>
+          </a:p>
+          <a:p>
+            <a:r>
+              <a:rPr lang="en-US" sz="1400">
+                <a:hlinkClick r:id="rId2"/>
+              </a:rPr>
+              <a:t>https://getbootstrap.com/docs/4.5/components/card/</a:t>
+            </a:r>
+            <a:endParaRPr lang="en-US" sz="1400" b="1">
+              <a:solidFill>
+                <a:srgbClr val="00B0F0"/>
+              </a:solidFill>
+            </a:endParaRPr>
+          </a:p>
+        </p:txBody>
+      </p:sp>
     </p:spTree>
     <p:extLst>
       <p:ext uri="{BB962C8B-B14F-4D97-AF65-F5344CB8AC3E}">
-        <p14:creationId xmlns:p14="http://schemas.microsoft.com/office/powerpoint/2010/main" val="2461045052"/>
+        <p14:creationId xmlns:p14="http://schemas.microsoft.com/office/powerpoint/2010/main" val="2847389661"/>
       </p:ext>
     </p:extLst>
   </p:cSld>
@@ -6260,19 +6484,14 @@
             <p:ph type="title"/>
           </p:nvPr>
         </p:nvSpPr>
-        <p:spPr>
-          <a:xfrm>
-            <a:off x="1066800" y="399314"/>
-            <a:ext cx="10058400" cy="1371600"/>
-          </a:xfrm>
-        </p:spPr>
+        <p:spPr/>
         <p:txBody>
           <a:bodyPr/>
           <a:lstStyle/>
           <a:p>
             <a:r>
               <a:rPr lang="en-US"/>
-              <a:t>Card Title and Subtitle</a:t>
+              <a:t>A Basic Card</a:t>
             </a:r>
           </a:p>
         </p:txBody>
@@ -6295,8 +6514,8 @@
         </p:nvSpPr>
         <p:spPr>
           <a:xfrm>
-            <a:off x="1066800" y="1770914"/>
-            <a:ext cx="7624193" cy="3576227"/>
+            <a:off x="1066800" y="2103120"/>
+            <a:ext cx="5029200" cy="3114832"/>
           </a:xfrm>
         </p:spPr>
         <p:txBody>
@@ -6364,58 +6583,6 @@
               <a:rPr lang="en-US" sz="1600">
                 <a:latin typeface="Consolas" panose="020B0609020204030204" pitchFamily="49" charset="0"/>
               </a:rPr>
-              <a:t>    &lt;h5 class="</a:t>
-            </a:r>
-            <a:r>
-              <a:rPr lang="en-US" sz="1600">
-                <a:highlight>
-                  <a:srgbClr val="F8D22F"/>
-                </a:highlight>
-                <a:latin typeface="Consolas" panose="020B0609020204030204" pitchFamily="49" charset="0"/>
-              </a:rPr>
-              <a:t>card-title</a:t>
-            </a:r>
-            <a:r>
-              <a:rPr lang="en-US" sz="1600">
-                <a:latin typeface="Consolas" panose="020B0609020204030204" pitchFamily="49" charset="0"/>
-              </a:rPr>
-              <a:t> mb-2"&gt;Card title&lt;/h5&gt;</a:t>
-            </a:r>
-          </a:p>
-          <a:p>
-            <a:pPr marL="0" indent="0">
-              <a:buNone/>
-            </a:pPr>
-            <a:r>
-              <a:rPr lang="en-US" sz="1600">
-                <a:latin typeface="Consolas" panose="020B0609020204030204" pitchFamily="49" charset="0"/>
-              </a:rPr>
-              <a:t>    &lt;h6 class="</a:t>
-            </a:r>
-            <a:r>
-              <a:rPr lang="en-US" sz="1600">
-                <a:highlight>
-                  <a:srgbClr val="F8D22F"/>
-                </a:highlight>
-                <a:latin typeface="Consolas" panose="020B0609020204030204" pitchFamily="49" charset="0"/>
-              </a:rPr>
-              <a:t>card-subtitle</a:t>
-            </a:r>
-            <a:r>
-              <a:rPr lang="en-US" sz="1600">
-                <a:latin typeface="Consolas" panose="020B0609020204030204" pitchFamily="49" charset="0"/>
-              </a:rPr>
-              <a:t> mb-2 text-muted"&gt;Card subtitle&lt;/h6&gt;</a:t>
-            </a:r>
-          </a:p>
-          <a:p>
-            <a:pPr marL="0" indent="0">
-              <a:buNone/>
-            </a:pPr>
-            <a:r>
-              <a:rPr lang="en-US" sz="1600">
-                <a:latin typeface="Consolas" panose="020B0609020204030204" pitchFamily="49" charset="0"/>
-              </a:rPr>
               <a:t>    &lt;p class="</a:t>
             </a:r>
             <a:r>
@@ -6460,10 +6627,10 @@
       </p:sp>
       <p:pic>
         <p:nvPicPr>
-          <p:cNvPr id="5" name="Picture 4">
+          <p:cNvPr id="4" name="Picture 3">
             <a:extLst>
               <a:ext uri="{FF2B5EF4-FFF2-40B4-BE49-F238E27FC236}">
-                <a16:creationId xmlns:a16="http://schemas.microsoft.com/office/drawing/2014/main" id="{38A56AD4-13A9-427A-9E1A-82B1156FFB05}"/>
+                <a16:creationId xmlns:a16="http://schemas.microsoft.com/office/drawing/2014/main" id="{8B803263-7E71-4721-9916-A1C37A4A729E}"/>
               </a:ext>
             </a:extLst>
           </p:cNvPr>
@@ -6480,8 +6647,8 @@
         </p:blipFill>
         <p:spPr>
           <a:xfrm>
-            <a:off x="6263910" y="3960967"/>
-            <a:ext cx="4429125" cy="1485900"/>
+            <a:off x="5693329" y="3993203"/>
+            <a:ext cx="4486275" cy="1019175"/>
           </a:xfrm>
           <a:prstGeom prst="rect">
             <a:avLst/>
@@ -6491,7 +6658,7 @@
     </p:spTree>
     <p:extLst>
       <p:ext uri="{BB962C8B-B14F-4D97-AF65-F5344CB8AC3E}">
-        <p14:creationId xmlns:p14="http://schemas.microsoft.com/office/powerpoint/2010/main" val="3864129453"/>
+        <p14:creationId xmlns:p14="http://schemas.microsoft.com/office/powerpoint/2010/main" val="2461045052"/>
       </p:ext>
     </p:extLst>
   </p:cSld>
@@ -6546,7 +6713,7 @@
           <a:p>
             <a:r>
               <a:rPr lang="en-US"/>
-              <a:t>Card Header</a:t>
+              <a:t>Card Title and Subtitle</a:t>
             </a:r>
           </a:p>
         </p:txBody>
@@ -6569,8 +6736,8 @@
         </p:nvSpPr>
         <p:spPr>
           <a:xfrm>
-            <a:off x="1066800" y="1711354"/>
-            <a:ext cx="7624193" cy="4563611"/>
+            <a:off x="1066800" y="1770914"/>
+            <a:ext cx="7624193" cy="3576227"/>
           </a:xfrm>
         </p:spPr>
         <p:txBody>
@@ -6612,7 +6779,33 @@
               <a:rPr lang="en-US" sz="1600">
                 <a:latin typeface="Consolas" panose="020B0609020204030204" pitchFamily="49" charset="0"/>
               </a:rPr>
-              <a:t>  &lt;div class="</a:t>
+              <a:t>  &lt;div class="</a:t>
+            </a:r>
+            <a:r>
+              <a:rPr lang="en-US" sz="1600">
+                <a:highlight>
+                  <a:srgbClr val="FCF7F1"/>
+                </a:highlight>
+                <a:latin typeface="Consolas" panose="020B0609020204030204" pitchFamily="49" charset="0"/>
+              </a:rPr>
+              <a:t>card-body</a:t>
+            </a:r>
+            <a:r>
+              <a:rPr lang="en-US" sz="1600">
+                <a:latin typeface="Consolas" panose="020B0609020204030204" pitchFamily="49" charset="0"/>
+              </a:rPr>
+              <a:t>"&gt;</a:t>
+            </a:r>
+          </a:p>
+          <a:p>
+            <a:pPr marL="0" indent="0">
+              <a:buNone/>
+            </a:pPr>
+            <a:r>
+              <a:rPr lang="en-US" sz="1600">
+                <a:latin typeface="Consolas" panose="020B0609020204030204" pitchFamily="49" charset="0"/>
+              </a:rPr>
+              <a:t>    &lt;h5 class="</a:t>
             </a:r>
             <a:r>
               <a:rPr lang="en-US" sz="1600">
@@ -6621,24 +6814,50 @@
                 </a:highlight>
                 <a:latin typeface="Consolas" panose="020B0609020204030204" pitchFamily="49" charset="0"/>
               </a:rPr>
-              <a:t>card-header</a:t>
-            </a:r>
-            <a:r>
-              <a:rPr lang="en-US" sz="1600">
-                <a:latin typeface="Consolas" panose="020B0609020204030204" pitchFamily="49" charset="0"/>
-              </a:rPr>
-              <a:t>"&gt;</a:t>
-            </a:r>
-          </a:p>
-          <a:p>
-            <a:pPr marL="0" indent="0">
-              <a:buNone/>
-            </a:pPr>
-            <a:r>
-              <a:rPr lang="en-US" sz="1600">
-                <a:latin typeface="Consolas" panose="020B0609020204030204" pitchFamily="49" charset="0"/>
-              </a:rPr>
-              <a:t>    &lt;h5 class="</a:t>
+              <a:t>card-title</a:t>
+            </a:r>
+            <a:r>
+              <a:rPr lang="en-US" sz="1600">
+                <a:latin typeface="Consolas" panose="020B0609020204030204" pitchFamily="49" charset="0"/>
+              </a:rPr>
+              <a:t> mb-2"&gt;Card title&lt;/h5&gt;</a:t>
+            </a:r>
+          </a:p>
+          <a:p>
+            <a:pPr marL="0" indent="0">
+              <a:buNone/>
+            </a:pPr>
+            <a:r>
+              <a:rPr lang="en-US" sz="1600">
+                <a:latin typeface="Consolas" panose="020B0609020204030204" pitchFamily="49" charset="0"/>
+              </a:rPr>
+              <a:t>    &lt;h6 class="</a:t>
+            </a:r>
+            <a:r>
+              <a:rPr lang="en-US" sz="1600">
+                <a:highlight>
+                  <a:srgbClr val="F8D22F"/>
+                </a:highlight>
+                <a:latin typeface="Consolas" panose="020B0609020204030204" pitchFamily="49" charset="0"/>
+              </a:rPr>
+              <a:t>card-subtitle</a:t>
+            </a:r>
+            <a:r>
+              <a:rPr lang="en-US" sz="1600">
+                <a:latin typeface="Consolas" panose="020B0609020204030204" pitchFamily="49" charset="0"/>
+              </a:rPr>
+              <a:t> mb-2 text-muted"&gt;Card subtitle&lt;/h6&gt;</a:t>
+            </a:r>
+          </a:p>
+          <a:p>
+            <a:pPr marL="0" indent="0">
+              <a:buNone/>
+            </a:pPr>
+            <a:r>
+              <a:rPr lang="en-US" sz="1600">
+                <a:latin typeface="Consolas" panose="020B0609020204030204" pitchFamily="49" charset="0"/>
+              </a:rPr>
+              <a:t>    &lt;p class="</a:t>
             </a:r>
             <a:r>
               <a:rPr lang="en-US" sz="1600">
@@ -6647,95 +6866,6 @@
                 </a:highlight>
                 <a:latin typeface="Consolas" panose="020B0609020204030204" pitchFamily="49" charset="0"/>
               </a:rPr>
-              <a:t>card-title</a:t>
-            </a:r>
-            <a:r>
-              <a:rPr lang="en-US" sz="1600">
-                <a:latin typeface="Consolas" panose="020B0609020204030204" pitchFamily="49" charset="0"/>
-              </a:rPr>
-              <a:t> mb-2"&gt;Card title&lt;/h5&gt;</a:t>
-            </a:r>
-          </a:p>
-          <a:p>
-            <a:pPr marL="0" indent="0">
-              <a:buNone/>
-            </a:pPr>
-            <a:r>
-              <a:rPr lang="en-US" sz="1600">
-                <a:latin typeface="Consolas" panose="020B0609020204030204" pitchFamily="49" charset="0"/>
-              </a:rPr>
-              <a:t>    &lt;h6 class="</a:t>
-            </a:r>
-            <a:r>
-              <a:rPr lang="en-US" sz="1600">
-                <a:highlight>
-                  <a:srgbClr val="FCF7F1"/>
-                </a:highlight>
-                <a:latin typeface="Consolas" panose="020B0609020204030204" pitchFamily="49" charset="0"/>
-              </a:rPr>
-              <a:t>card-subtitle</a:t>
-            </a:r>
-            <a:r>
-              <a:rPr lang="en-US" sz="1600">
-                <a:latin typeface="Consolas" panose="020B0609020204030204" pitchFamily="49" charset="0"/>
-              </a:rPr>
-              <a:t> mb-2 text-muted"&gt;Card subtitle&lt;/h6&gt;  </a:t>
-            </a:r>
-          </a:p>
-          <a:p>
-            <a:pPr marL="0" indent="0">
-              <a:buNone/>
-            </a:pPr>
-            <a:r>
-              <a:rPr lang="en-US" sz="1600">
-                <a:latin typeface="Consolas" panose="020B0609020204030204" pitchFamily="49" charset="0"/>
-              </a:rPr>
-              <a:t>  &lt;/div&gt;</a:t>
-            </a:r>
-          </a:p>
-          <a:p>
-            <a:pPr marL="0" indent="0">
-              <a:buNone/>
-            </a:pPr>
-            <a:r>
-              <a:rPr lang="en-US" sz="1600">
-                <a:latin typeface="Consolas" panose="020B0609020204030204" pitchFamily="49" charset="0"/>
-              </a:rPr>
-              <a:t>  &lt;div class="</a:t>
-            </a:r>
-            <a:r>
-              <a:rPr lang="en-US" sz="1600">
-                <a:highlight>
-                  <a:srgbClr val="FCF7F1"/>
-                </a:highlight>
-                <a:latin typeface="Consolas" panose="020B0609020204030204" pitchFamily="49" charset="0"/>
-              </a:rPr>
-              <a:t>card-body</a:t>
-            </a:r>
-            <a:r>
-              <a:rPr lang="en-US" sz="1600">
-                <a:latin typeface="Consolas" panose="020B0609020204030204" pitchFamily="49" charset="0"/>
-              </a:rPr>
-              <a:t>"&gt;</a:t>
-            </a:r>
-          </a:p>
-          <a:p>
-            <a:pPr marL="0" indent="0">
-              <a:buNone/>
-            </a:pPr>
-            <a:r>
-              <a:rPr lang="en-US" sz="1600">
-                <a:latin typeface="Consolas" panose="020B0609020204030204" pitchFamily="49" charset="0"/>
-              </a:rPr>
-              <a:t>    &lt;p class="</a:t>
-            </a:r>
-            <a:r>
-              <a:rPr lang="en-US" sz="1600">
-                <a:highlight>
-                  <a:srgbClr val="FCF7F1"/>
-                </a:highlight>
-                <a:latin typeface="Consolas" panose="020B0609020204030204" pitchFamily="49" charset="0"/>
-              </a:rPr>
               <a:t>card-text</a:t>
             </a:r>
             <a:r>
@@ -6771,10 +6901,10 @@
       </p:sp>
       <p:pic>
         <p:nvPicPr>
-          <p:cNvPr id="4" name="Picture 3">
+          <p:cNvPr id="5" name="Picture 4">
             <a:extLst>
               <a:ext uri="{FF2B5EF4-FFF2-40B4-BE49-F238E27FC236}">
-                <a16:creationId xmlns:a16="http://schemas.microsoft.com/office/drawing/2014/main" id="{37BEFA2F-0DA0-47B8-A123-54E024D5F351}"/>
+                <a16:creationId xmlns:a16="http://schemas.microsoft.com/office/drawing/2014/main" id="{38A56AD4-13A9-427A-9E1A-82B1156FFB05}"/>
               </a:ext>
             </a:extLst>
           </p:cNvPr>
@@ -6791,8 +6921,8 @@
         </p:blipFill>
         <p:spPr>
           <a:xfrm>
-            <a:off x="6262452" y="4033482"/>
-            <a:ext cx="4495800" cy="1771650"/>
+            <a:off x="6263910" y="3960967"/>
+            <a:ext cx="4429125" cy="1485900"/>
           </a:xfrm>
           <a:prstGeom prst="rect">
             <a:avLst/>
@@ -6802,7 +6932,7 @@
     </p:spTree>
     <p:extLst>
       <p:ext uri="{BB962C8B-B14F-4D97-AF65-F5344CB8AC3E}">
-        <p14:creationId xmlns:p14="http://schemas.microsoft.com/office/powerpoint/2010/main" val="3123249319"/>
+        <p14:creationId xmlns:p14="http://schemas.microsoft.com/office/powerpoint/2010/main" val="3864129453"/>
       </p:ext>
     </p:extLst>
   </p:cSld>
@@ -6857,7 +6987,7 @@
           <a:p>
             <a:r>
               <a:rPr lang="en-US"/>
-              <a:t>Card Footer</a:t>
+              <a:t>Card Header</a:t>
             </a:r>
           </a:p>
         </p:txBody>
@@ -6923,7 +7053,33 @@
               <a:rPr lang="en-US" sz="1600">
                 <a:latin typeface="Consolas" panose="020B0609020204030204" pitchFamily="49" charset="0"/>
               </a:rPr>
-              <a:t>  &lt;div class="</a:t>
+              <a:t>  &lt;div class="</a:t>
+            </a:r>
+            <a:r>
+              <a:rPr lang="en-US" sz="1600">
+                <a:highlight>
+                  <a:srgbClr val="F8D22F"/>
+                </a:highlight>
+                <a:latin typeface="Consolas" panose="020B0609020204030204" pitchFamily="49" charset="0"/>
+              </a:rPr>
+              <a:t>card-header</a:t>
+            </a:r>
+            <a:r>
+              <a:rPr lang="en-US" sz="1600">
+                <a:latin typeface="Consolas" panose="020B0609020204030204" pitchFamily="49" charset="0"/>
+              </a:rPr>
+              <a:t>"&gt;</a:t>
+            </a:r>
+          </a:p>
+          <a:p>
+            <a:pPr marL="0" indent="0">
+              <a:buNone/>
+            </a:pPr>
+            <a:r>
+              <a:rPr lang="en-US" sz="1600">
+                <a:latin typeface="Consolas" panose="020B0609020204030204" pitchFamily="49" charset="0"/>
+              </a:rPr>
+              <a:t>    &lt;h5 class="</a:t>
             </a:r>
             <a:r>
               <a:rPr lang="en-US" sz="1600">
@@ -6932,24 +7088,24 @@
                 </a:highlight>
                 <a:latin typeface="Consolas" panose="020B0609020204030204" pitchFamily="49" charset="0"/>
               </a:rPr>
-              <a:t>card-body</a:t>
-            </a:r>
-            <a:r>
-              <a:rPr lang="en-US" sz="1600">
-                <a:latin typeface="Consolas" panose="020B0609020204030204" pitchFamily="49" charset="0"/>
-              </a:rPr>
-              <a:t>"&gt;</a:t>
-            </a:r>
-          </a:p>
-          <a:p>
-            <a:pPr marL="0" indent="0">
-              <a:buNone/>
-            </a:pPr>
-            <a:r>
-              <a:rPr lang="en-US" sz="1600">
-                <a:latin typeface="Consolas" panose="020B0609020204030204" pitchFamily="49" charset="0"/>
-              </a:rPr>
-              <a:t>    &lt;p class="</a:t>
+              <a:t>card-title</a:t>
+            </a:r>
+            <a:r>
+              <a:rPr lang="en-US" sz="1600">
+                <a:latin typeface="Consolas" panose="020B0609020204030204" pitchFamily="49" charset="0"/>
+              </a:rPr>
+              <a:t> mb-2"&gt;Card title&lt;/h5&gt;</a:t>
+            </a:r>
+          </a:p>
+          <a:p>
+            <a:pPr marL="0" indent="0">
+              <a:buNone/>
+            </a:pPr>
+            <a:r>
+              <a:rPr lang="en-US" sz="1600">
+                <a:latin typeface="Consolas" panose="020B0609020204030204" pitchFamily="49" charset="0"/>
+              </a:rPr>
+              <a:t>    &lt;h6 class="</a:t>
             </a:r>
             <a:r>
               <a:rPr lang="en-US" sz="1600">
@@ -6958,6 +7114,69 @@
                 </a:highlight>
                 <a:latin typeface="Consolas" panose="020B0609020204030204" pitchFamily="49" charset="0"/>
               </a:rPr>
+              <a:t>card-subtitle</a:t>
+            </a:r>
+            <a:r>
+              <a:rPr lang="en-US" sz="1600">
+                <a:latin typeface="Consolas" panose="020B0609020204030204" pitchFamily="49" charset="0"/>
+              </a:rPr>
+              <a:t> mb-2 text-muted"&gt;Card subtitle&lt;/h6&gt;  </a:t>
+            </a:r>
+          </a:p>
+          <a:p>
+            <a:pPr marL="0" indent="0">
+              <a:buNone/>
+            </a:pPr>
+            <a:r>
+              <a:rPr lang="en-US" sz="1600">
+                <a:latin typeface="Consolas" panose="020B0609020204030204" pitchFamily="49" charset="0"/>
+              </a:rPr>
+              <a:t>  &lt;/div&gt;</a:t>
+            </a:r>
+          </a:p>
+          <a:p>
+            <a:pPr marL="0" indent="0">
+              <a:buNone/>
+            </a:pPr>
+            <a:r>
+              <a:rPr lang="en-US" sz="1600">
+                <a:latin typeface="Consolas" panose="020B0609020204030204" pitchFamily="49" charset="0"/>
+              </a:rPr>
+              <a:t>  &lt;div class="</a:t>
+            </a:r>
+            <a:r>
+              <a:rPr lang="en-US" sz="1600">
+                <a:highlight>
+                  <a:srgbClr val="FCF7F1"/>
+                </a:highlight>
+                <a:latin typeface="Consolas" panose="020B0609020204030204" pitchFamily="49" charset="0"/>
+              </a:rPr>
+              <a:t>card-body</a:t>
+            </a:r>
+            <a:r>
+              <a:rPr lang="en-US" sz="1600">
+                <a:latin typeface="Consolas" panose="020B0609020204030204" pitchFamily="49" charset="0"/>
+              </a:rPr>
+              <a:t>"&gt;</a:t>
+            </a:r>
+          </a:p>
+          <a:p>
+            <a:pPr marL="0" indent="0">
+              <a:buNone/>
+            </a:pPr>
+            <a:r>
+              <a:rPr lang="en-US" sz="1600">
+                <a:latin typeface="Consolas" panose="020B0609020204030204" pitchFamily="49" charset="0"/>
+              </a:rPr>
+              <a:t>    &lt;p class="</a:t>
+            </a:r>
+            <a:r>
+              <a:rPr lang="en-US" sz="1600">
+                <a:highlight>
+                  <a:srgbClr val="FCF7F1"/>
+                </a:highlight>
+                <a:latin typeface="Consolas" panose="020B0609020204030204" pitchFamily="49" charset="0"/>
+              </a:rPr>
               <a:t>card-text</a:t>
             </a:r>
             <a:r>
@@ -6965,54 +7184,6 @@
                 <a:latin typeface="Consolas" panose="020B0609020204030204" pitchFamily="49" charset="0"/>
               </a:rPr>
               <a:t>"&gt;lorem ipsum...&lt;/p&gt;</a:t>
-            </a:r>
-          </a:p>
-          <a:p>
-            <a:pPr marL="0" indent="0">
-              <a:buNone/>
-            </a:pPr>
-            <a:r>
-              <a:rPr lang="en-US" sz="1600">
-                <a:latin typeface="Consolas" panose="020B0609020204030204" pitchFamily="49" charset="0"/>
-              </a:rPr>
-              <a:t>  &lt;/div&gt;</a:t>
-            </a:r>
-          </a:p>
-          <a:p>
-            <a:pPr marL="0" indent="0">
-              <a:buNone/>
-            </a:pPr>
-            <a:r>
-              <a:rPr lang="en-US" sz="1600">
-                <a:latin typeface="Consolas" panose="020B0609020204030204" pitchFamily="49" charset="0"/>
-              </a:rPr>
-              <a:t>  &lt;div class="</a:t>
-            </a:r>
-            <a:r>
-              <a:rPr lang="en-US" sz="1600">
-                <a:highlight>
-                  <a:srgbClr val="F8D22F"/>
-                </a:highlight>
-                <a:latin typeface="Consolas" panose="020B0609020204030204" pitchFamily="49" charset="0"/>
-              </a:rPr>
-              <a:t>card-footer</a:t>
-            </a:r>
-            <a:r>
-              <a:rPr lang="en-US" sz="1600">
-                <a:latin typeface="Consolas" panose="020B0609020204030204" pitchFamily="49" charset="0"/>
-              </a:rPr>
-              <a:t>"&gt;</a:t>
-            </a:r>
-          </a:p>
-          <a:p>
-            <a:pPr marL="0" indent="0">
-              <a:buNone/>
-            </a:pPr>
-            <a:r>
-              <a:rPr lang="en-US" sz="1600">
-                <a:latin typeface="Consolas" panose="020B0609020204030204" pitchFamily="49" charset="0"/>
-              </a:rPr>
-              <a:t>    2 days ago </a:t>
             </a:r>
           </a:p>
           <a:p>
@@ -7041,10 +7212,10 @@
       </p:sp>
       <p:pic>
         <p:nvPicPr>
-          <p:cNvPr id="5" name="Picture 4">
+          <p:cNvPr id="4" name="Picture 3">
             <a:extLst>
               <a:ext uri="{FF2B5EF4-FFF2-40B4-BE49-F238E27FC236}">
-                <a16:creationId xmlns:a16="http://schemas.microsoft.com/office/drawing/2014/main" id="{A77068F7-6BB3-4157-9A6F-839E54720DA4}"/>
+                <a16:creationId xmlns:a16="http://schemas.microsoft.com/office/drawing/2014/main" id="{37BEFA2F-0DA0-47B8-A123-54E024D5F351}"/>
               </a:ext>
             </a:extLst>
           </p:cNvPr>
@@ -7061,8 +7232,8 @@
         </p:blipFill>
         <p:spPr>
           <a:xfrm>
-            <a:off x="6344412" y="4181284"/>
-            <a:ext cx="4495800" cy="1476375"/>
+            <a:off x="6262452" y="4033482"/>
+            <a:ext cx="4495800" cy="1771650"/>
           </a:xfrm>
           <a:prstGeom prst="rect">
             <a:avLst/>
@@ -7072,7 +7243,7 @@
     </p:spTree>
     <p:extLst>
       <p:ext uri="{BB962C8B-B14F-4D97-AF65-F5344CB8AC3E}">
-        <p14:creationId xmlns:p14="http://schemas.microsoft.com/office/powerpoint/2010/main" val="3790420758"/>
+        <p14:creationId xmlns:p14="http://schemas.microsoft.com/office/powerpoint/2010/main" val="3123249319"/>
       </p:ext>
     </p:extLst>
   </p:cSld>
@@ -7127,7 +7298,7 @@
           <a:p>
             <a:r>
               <a:rPr lang="en-US"/>
-              <a:t>Card Header and Footer</a:t>
+              <a:t>Card Footer</a:t>
             </a:r>
           </a:p>
         </p:txBody>
@@ -7150,8 +7321,8 @@
         </p:nvSpPr>
         <p:spPr>
           <a:xfrm>
-            <a:off x="1066800" y="1442906"/>
-            <a:ext cx="7624193" cy="5015780"/>
+            <a:off x="1066800" y="1711354"/>
+            <a:ext cx="7624193" cy="4563611"/>
           </a:xfrm>
         </p:spPr>
         <p:txBody>
@@ -7183,54 +7354,6 @@
                 <a:latin typeface="Consolas" panose="020B0609020204030204" pitchFamily="49" charset="0"/>
               </a:rPr>
               <a:t> mb-3"&gt;</a:t>
-            </a:r>
-          </a:p>
-          <a:p>
-            <a:pPr marL="0" indent="0">
-              <a:buNone/>
-            </a:pPr>
-            <a:r>
-              <a:rPr lang="en-US" sz="1600">
-                <a:latin typeface="Consolas" panose="020B0609020204030204" pitchFamily="49" charset="0"/>
-              </a:rPr>
-              <a:t>  &lt;div class="</a:t>
-            </a:r>
-            <a:r>
-              <a:rPr lang="en-US" sz="1600">
-                <a:highlight>
-                  <a:srgbClr val="F8D22F"/>
-                </a:highlight>
-                <a:latin typeface="Consolas" panose="020B0609020204030204" pitchFamily="49" charset="0"/>
-              </a:rPr>
-              <a:t>card-header</a:t>
-            </a:r>
-            <a:r>
-              <a:rPr lang="en-US" sz="1600">
-                <a:latin typeface="Consolas" panose="020B0609020204030204" pitchFamily="49" charset="0"/>
-              </a:rPr>
-              <a:t>"&gt;</a:t>
-            </a:r>
-          </a:p>
-          <a:p>
-            <a:pPr marL="0" indent="0">
-              <a:buNone/>
-            </a:pPr>
-            <a:r>
-              <a:rPr lang="en-US" sz="1600">
-                <a:latin typeface="Consolas" panose="020B0609020204030204" pitchFamily="49" charset="0"/>
-              </a:rPr>
-              <a:t>    Featured  </a:t>
-            </a:r>
-          </a:p>
-          <a:p>
-            <a:pPr marL="0" indent="0">
-              <a:buNone/>
-            </a:pPr>
-            <a:r>
-              <a:rPr lang="en-US" sz="1600">
-                <a:latin typeface="Consolas" panose="020B0609020204030204" pitchFamily="49" charset="0"/>
-              </a:rPr>
-              <a:t>  &lt;/div&gt;</a:t>
             </a:r>
           </a:p>
           <a:p>
@@ -7362,7 +7485,7 @@
           <p:cNvPr id="5" name="Picture 4">
             <a:extLst>
               <a:ext uri="{FF2B5EF4-FFF2-40B4-BE49-F238E27FC236}">
-                <a16:creationId xmlns:a16="http://schemas.microsoft.com/office/drawing/2014/main" id="{B886FB40-E4DB-422B-A590-FE7F1BFB1DCF}"/>
+                <a16:creationId xmlns:a16="http://schemas.microsoft.com/office/drawing/2014/main" id="{A77068F7-6BB3-4157-9A6F-839E54720DA4}"/>
               </a:ext>
             </a:extLst>
           </p:cNvPr>
@@ -7379,8 +7502,8 @@
         </p:blipFill>
         <p:spPr>
           <a:xfrm>
-            <a:off x="6629400" y="3471994"/>
-            <a:ext cx="4495800" cy="1943100"/>
+            <a:off x="6344412" y="4181284"/>
+            <a:ext cx="4495800" cy="1476375"/>
           </a:xfrm>
           <a:prstGeom prst="rect">
             <a:avLst/>
@@ -7390,7 +7513,7 @@
     </p:spTree>
     <p:extLst>
       <p:ext uri="{BB962C8B-B14F-4D97-AF65-F5344CB8AC3E}">
-        <p14:creationId xmlns:p14="http://schemas.microsoft.com/office/powerpoint/2010/main" val="1040485274"/>
+        <p14:creationId xmlns:p14="http://schemas.microsoft.com/office/powerpoint/2010/main" val="3790420758"/>
       </p:ext>
     </p:extLst>
   </p:cSld>
@@ -7445,7 +7568,7 @@
           <a:p>
             <a:r>
               <a:rPr lang="en-US"/>
-              <a:t>Card with Button</a:t>
+              <a:t>Card Header and Footer</a:t>
             </a:r>
           </a:p>
         </p:txBody>
@@ -7511,6 +7634,54 @@
               <a:rPr lang="en-US" sz="1600">
                 <a:latin typeface="Consolas" panose="020B0609020204030204" pitchFamily="49" charset="0"/>
               </a:rPr>
+              <a:t>  &lt;div class="</a:t>
+            </a:r>
+            <a:r>
+              <a:rPr lang="en-US" sz="1600">
+                <a:highlight>
+                  <a:srgbClr val="F8D22F"/>
+                </a:highlight>
+                <a:latin typeface="Consolas" panose="020B0609020204030204" pitchFamily="49" charset="0"/>
+              </a:rPr>
+              <a:t>card-header</a:t>
+            </a:r>
+            <a:r>
+              <a:rPr lang="en-US" sz="1600">
+                <a:latin typeface="Consolas" panose="020B0609020204030204" pitchFamily="49" charset="0"/>
+              </a:rPr>
+              <a:t>"&gt;</a:t>
+            </a:r>
+          </a:p>
+          <a:p>
+            <a:pPr marL="0" indent="0">
+              <a:buNone/>
+            </a:pPr>
+            <a:r>
+              <a:rPr lang="en-US" sz="1600">
+                <a:latin typeface="Consolas" panose="020B0609020204030204" pitchFamily="49" charset="0"/>
+              </a:rPr>
+              <a:t>    Featured  </a:t>
+            </a:r>
+          </a:p>
+          <a:p>
+            <a:pPr marL="0" indent="0">
+              <a:buNone/>
+            </a:pPr>
+            <a:r>
+              <a:rPr lang="en-US" sz="1600">
+                <a:latin typeface="Consolas" panose="020B0609020204030204" pitchFamily="49" charset="0"/>
+              </a:rPr>
+              <a:t>  &lt;/div&gt;</a:t>
+            </a:r>
+          </a:p>
+          <a:p>
+            <a:pPr marL="0" indent="0">
+              <a:buNone/>
+            </a:pPr>
+            <a:r>
+              <a:rPr lang="en-US" sz="1600">
+                <a:latin typeface="Consolas" panose="020B0609020204030204" pitchFamily="49" charset="0"/>
+              </a:rPr>
               <a:t>  &lt;div class="</a:t>
             </a:r>
             <a:r>
@@ -7537,7 +7708,7 @@
               <a:rPr lang="en-US" sz="1600">
                 <a:latin typeface="Consolas" panose="020B0609020204030204" pitchFamily="49" charset="0"/>
               </a:rPr>
-              <a:t>    &lt;h5 class="</a:t>
+              <a:t>    &lt;p class="</a:t>
             </a:r>
             <a:r>
               <a:rPr lang="en-US" sz="1600">
@@ -7546,32 +7717,6 @@
                 </a:highlight>
                 <a:latin typeface="Consolas" panose="020B0609020204030204" pitchFamily="49" charset="0"/>
               </a:rPr>
-              <a:t>card-title</a:t>
-            </a:r>
-            <a:r>
-              <a:rPr lang="en-US" sz="1600">
-                <a:latin typeface="Consolas" panose="020B0609020204030204" pitchFamily="49" charset="0"/>
-              </a:rPr>
-              <a:t> mb-2"&gt;Card title&lt;/h5&gt;</a:t>
-            </a:r>
-          </a:p>
-          <a:p>
-            <a:pPr marL="0" indent="0">
-              <a:buNone/>
-            </a:pPr>
-            <a:r>
-              <a:rPr lang="en-US" sz="1600">
-                <a:latin typeface="Consolas" panose="020B0609020204030204" pitchFamily="49" charset="0"/>
-              </a:rPr>
-              <a:t>    &lt;p class="</a:t>
-            </a:r>
-            <a:r>
-              <a:rPr lang="en-US" sz="1600">
-                <a:highlight>
-                  <a:srgbClr val="FCF7F1"/>
-                </a:highlight>
-                <a:latin typeface="Consolas" panose="020B0609020204030204" pitchFamily="49" charset="0"/>
-              </a:rPr>
               <a:t>card-text</a:t>
             </a:r>
             <a:r>
@@ -7589,7 +7734,18 @@
               <a:rPr lang="en-US" sz="1600">
                 <a:latin typeface="Consolas" panose="020B0609020204030204" pitchFamily="49" charset="0"/>
               </a:rPr>
-              <a:t>    </a:t>
+              <a:t>  &lt;/div&gt;</a:t>
+            </a:r>
+          </a:p>
+          <a:p>
+            <a:pPr marL="0" indent="0">
+              <a:buNone/>
+            </a:pPr>
+            <a:r>
+              <a:rPr lang="en-US" sz="1600">
+                <a:latin typeface="Consolas" panose="020B0609020204030204" pitchFamily="49" charset="0"/>
+              </a:rPr>
+              <a:t>  &lt;div class="</a:t>
             </a:r>
             <a:r>
               <a:rPr lang="en-US" sz="1600">
@@ -7598,7 +7754,24 @@
                 </a:highlight>
                 <a:latin typeface="Consolas" panose="020B0609020204030204" pitchFamily="49" charset="0"/>
               </a:rPr>
-              <a:t>&lt;a href="#" class="btn btn-primary"&gt;Go somewhere&lt;/a&gt;</a:t>
+              <a:t>card-footer</a:t>
+            </a:r>
+            <a:r>
+              <a:rPr lang="en-US" sz="1600">
+                <a:latin typeface="Consolas" panose="020B0609020204030204" pitchFamily="49" charset="0"/>
+              </a:rPr>
+              <a:t>"&gt;</a:t>
+            </a:r>
+          </a:p>
+          <a:p>
+            <a:pPr marL="0" indent="0">
+              <a:buNone/>
+            </a:pPr>
+            <a:r>
+              <a:rPr lang="en-US" sz="1600">
+                <a:latin typeface="Consolas" panose="020B0609020204030204" pitchFamily="49" charset="0"/>
+              </a:rPr>
+              <a:t>    2 days ago </a:t>
             </a:r>
           </a:p>
           <a:p>
@@ -7627,10 +7800,10 @@
       </p:sp>
       <p:pic>
         <p:nvPicPr>
-          <p:cNvPr id="4" name="Picture 3">
+          <p:cNvPr id="5" name="Picture 4">
             <a:extLst>
               <a:ext uri="{FF2B5EF4-FFF2-40B4-BE49-F238E27FC236}">
-                <a16:creationId xmlns:a16="http://schemas.microsoft.com/office/drawing/2014/main" id="{CE92D6BC-82FE-4853-8670-FB37E3507BB0}"/>
+                <a16:creationId xmlns:a16="http://schemas.microsoft.com/office/drawing/2014/main" id="{B886FB40-E4DB-422B-A590-FE7F1BFB1DCF}"/>
               </a:ext>
             </a:extLst>
           </p:cNvPr>
@@ -7647,8 +7820,8 @@
         </p:blipFill>
         <p:spPr>
           <a:xfrm>
-            <a:off x="6443093" y="3950796"/>
-            <a:ext cx="4495800" cy="1895475"/>
+            <a:off x="6629400" y="3471994"/>
+            <a:ext cx="4495800" cy="1943100"/>
           </a:xfrm>
           <a:prstGeom prst="rect">
             <a:avLst/>
@@ -7658,7 +7831,7 @@
     </p:spTree>
     <p:extLst>
       <p:ext uri="{BB962C8B-B14F-4D97-AF65-F5344CB8AC3E}">
-        <p14:creationId xmlns:p14="http://schemas.microsoft.com/office/powerpoint/2010/main" val="291457754"/>
+        <p14:creationId xmlns:p14="http://schemas.microsoft.com/office/powerpoint/2010/main" val="1040485274"/>
       </p:ext>
     </p:extLst>
   </p:cSld>
@@ -7713,7 +7886,7 @@
           <a:p>
             <a:r>
               <a:rPr lang="en-US"/>
-              <a:t>Text Alignment</a:t>
+              <a:t>Card with Button</a:t>
             </a:r>
           </a:p>
         </p:txBody>
@@ -7768,7 +7941,96 @@
               <a:rPr lang="en-US" sz="1600">
                 <a:latin typeface="Consolas" panose="020B0609020204030204" pitchFamily="49" charset="0"/>
               </a:rPr>
-              <a:t> mb-3 </a:t>
+              <a:t> mb-3"&gt;</a:t>
+            </a:r>
+          </a:p>
+          <a:p>
+            <a:pPr marL="0" indent="0">
+              <a:buNone/>
+            </a:pPr>
+            <a:r>
+              <a:rPr lang="en-US" sz="1600">
+                <a:latin typeface="Consolas" panose="020B0609020204030204" pitchFamily="49" charset="0"/>
+              </a:rPr>
+              <a:t>  &lt;div class="</a:t>
+            </a:r>
+            <a:r>
+              <a:rPr lang="en-US" sz="1600">
+                <a:highlight>
+                  <a:srgbClr val="FCF7F1"/>
+                </a:highlight>
+                <a:latin typeface="Consolas" panose="020B0609020204030204" pitchFamily="49" charset="0"/>
+              </a:rPr>
+              <a:t>card-body</a:t>
+            </a:r>
+            <a:r>
+              <a:rPr lang="en-US" sz="1600">
+                <a:latin typeface="Consolas" panose="020B0609020204030204" pitchFamily="49" charset="0"/>
+              </a:rPr>
+              <a:t>"&gt;</a:t>
+            </a:r>
+          </a:p>
+          <a:p>
+            <a:pPr marL="0" indent="0">
+              <a:buNone/>
+            </a:pPr>
+            <a:r>
+              <a:rPr lang="en-US" sz="1600">
+                <a:latin typeface="Consolas" panose="020B0609020204030204" pitchFamily="49" charset="0"/>
+              </a:rPr>
+              <a:t>    &lt;h5 class="</a:t>
+            </a:r>
+            <a:r>
+              <a:rPr lang="en-US" sz="1600">
+                <a:highlight>
+                  <a:srgbClr val="FCF7F1"/>
+                </a:highlight>
+                <a:latin typeface="Consolas" panose="020B0609020204030204" pitchFamily="49" charset="0"/>
+              </a:rPr>
+              <a:t>card-title</a:t>
+            </a:r>
+            <a:r>
+              <a:rPr lang="en-US" sz="1600">
+                <a:latin typeface="Consolas" panose="020B0609020204030204" pitchFamily="49" charset="0"/>
+              </a:rPr>
+              <a:t> mb-2"&gt;Card title&lt;/h5&gt;</a:t>
+            </a:r>
+          </a:p>
+          <a:p>
+            <a:pPr marL="0" indent="0">
+              <a:buNone/>
+            </a:pPr>
+            <a:r>
+              <a:rPr lang="en-US" sz="1600">
+                <a:latin typeface="Consolas" panose="020B0609020204030204" pitchFamily="49" charset="0"/>
+              </a:rPr>
+              <a:t>    &lt;p class="</a:t>
+            </a:r>
+            <a:r>
+              <a:rPr lang="en-US" sz="1600">
+                <a:highlight>
+                  <a:srgbClr val="FCF7F1"/>
+                </a:highlight>
+                <a:latin typeface="Consolas" panose="020B0609020204030204" pitchFamily="49" charset="0"/>
+              </a:rPr>
+              <a:t>card-text</a:t>
+            </a:r>
+            <a:r>
+              <a:rPr lang="en-US" sz="1600">
+                <a:latin typeface="Consolas" panose="020B0609020204030204" pitchFamily="49" charset="0"/>
+              </a:rPr>
+              <a:t>"&gt;lorem ipsum...&lt;/p&gt;</a:t>
+            </a:r>
+          </a:p>
+          <a:p>
+            <a:pPr marL="0" indent="0">
+              <a:buNone/>
+            </a:pPr>
+            <a:r>
+              <a:rPr lang="en-US" sz="1600">
+                <a:latin typeface="Consolas" panose="020B0609020204030204" pitchFamily="49" charset="0"/>
+              </a:rPr>
+              <a:t>    </a:t>
             </a:r>
             <a:r>
               <a:rPr lang="en-US" sz="1600">
@@ -7777,102 +8039,7 @@
                 </a:highlight>
                 <a:latin typeface="Consolas" panose="020B0609020204030204" pitchFamily="49" charset="0"/>
               </a:rPr>
-              <a:t>text-center</a:t>
-            </a:r>
-            <a:r>
-              <a:rPr lang="en-US" sz="1600">
-                <a:latin typeface="Consolas" panose="020B0609020204030204" pitchFamily="49" charset="0"/>
-              </a:rPr>
-              <a:t>"&gt;</a:t>
-            </a:r>
-          </a:p>
-          <a:p>
-            <a:pPr marL="0" indent="0">
-              <a:buNone/>
-            </a:pPr>
-            <a:r>
-              <a:rPr lang="en-US" sz="1600">
-                <a:latin typeface="Consolas" panose="020B0609020204030204" pitchFamily="49" charset="0"/>
-              </a:rPr>
-              <a:t>  &lt;div class="</a:t>
-            </a:r>
-            <a:r>
-              <a:rPr lang="en-US" sz="1600">
-                <a:highlight>
-                  <a:srgbClr val="FCF7F1"/>
-                </a:highlight>
-                <a:latin typeface="Consolas" panose="020B0609020204030204" pitchFamily="49" charset="0"/>
-              </a:rPr>
-              <a:t>card-body</a:t>
-            </a:r>
-            <a:r>
-              <a:rPr lang="en-US" sz="1600">
-                <a:latin typeface="Consolas" panose="020B0609020204030204" pitchFamily="49" charset="0"/>
-              </a:rPr>
-              <a:t>"&gt;</a:t>
-            </a:r>
-          </a:p>
-          <a:p>
-            <a:pPr marL="0" indent="0">
-              <a:buNone/>
-            </a:pPr>
-            <a:r>
-              <a:rPr lang="en-US" sz="1600">
-                <a:latin typeface="Consolas" panose="020B0609020204030204" pitchFamily="49" charset="0"/>
-              </a:rPr>
-              <a:t>    &lt;h5 class="</a:t>
-            </a:r>
-            <a:r>
-              <a:rPr lang="en-US" sz="1600">
-                <a:highlight>
-                  <a:srgbClr val="FCF7F1"/>
-                </a:highlight>
-                <a:latin typeface="Consolas" panose="020B0609020204030204" pitchFamily="49" charset="0"/>
-              </a:rPr>
-              <a:t>card-title</a:t>
-            </a:r>
-            <a:r>
-              <a:rPr lang="en-US" sz="1600">
-                <a:latin typeface="Consolas" panose="020B0609020204030204" pitchFamily="49" charset="0"/>
-              </a:rPr>
-              <a:t> mb-2"&gt;Center Aligned&lt;/h5&gt;</a:t>
-            </a:r>
-          </a:p>
-          <a:p>
-            <a:pPr marL="0" indent="0">
-              <a:buNone/>
-            </a:pPr>
-            <a:r>
-              <a:rPr lang="en-US" sz="1600">
-                <a:latin typeface="Consolas" panose="020B0609020204030204" pitchFamily="49" charset="0"/>
-              </a:rPr>
-              <a:t>    &lt;p class="</a:t>
-            </a:r>
-            <a:r>
-              <a:rPr lang="en-US" sz="1600">
-                <a:highlight>
-                  <a:srgbClr val="FCF7F1"/>
-                </a:highlight>
-                <a:latin typeface="Consolas" panose="020B0609020204030204" pitchFamily="49" charset="0"/>
-              </a:rPr>
-              <a:t>card-text</a:t>
-            </a:r>
-            <a:r>
-              <a:rPr lang="en-US" sz="1600">
-                <a:latin typeface="Consolas" panose="020B0609020204030204" pitchFamily="49" charset="0"/>
-              </a:rPr>
-              <a:t>"&gt;lorem ipsum...&lt;/p&gt;</a:t>
-            </a:r>
-          </a:p>
-          <a:p>
-            <a:pPr marL="0" indent="0">
-              <a:buNone/>
-            </a:pPr>
-            <a:r>
-              <a:rPr lang="en-US" sz="1600">
-                <a:latin typeface="Consolas" panose="020B0609020204030204" pitchFamily="49" charset="0"/>
-              </a:rPr>
-              <a:t>    &lt;a href="#" class="btn btn-primary"&gt;Go somewhere&lt;/a&gt;</a:t>
+              <a:t>&lt;a href="#" class="btn btn-primary"&gt;Go somewhere&lt;/a&gt;</a:t>
             </a:r>
           </a:p>
           <a:p>
@@ -7901,10 +8068,10 @@
       </p:sp>
       <p:pic>
         <p:nvPicPr>
-          <p:cNvPr id="5" name="Picture 4">
+          <p:cNvPr id="4" name="Picture 3">
             <a:extLst>
               <a:ext uri="{FF2B5EF4-FFF2-40B4-BE49-F238E27FC236}">
-                <a16:creationId xmlns:a16="http://schemas.microsoft.com/office/drawing/2014/main" id="{E1316BB9-EE52-4930-B8AE-86307BE06858}"/>
+                <a16:creationId xmlns:a16="http://schemas.microsoft.com/office/drawing/2014/main" id="{CE92D6BC-82FE-4853-8670-FB37E3507BB0}"/>
               </a:ext>
             </a:extLst>
           </p:cNvPr>
@@ -7921,8 +8088,8 @@
         </p:blipFill>
         <p:spPr>
           <a:xfrm>
-            <a:off x="7792894" y="1047684"/>
-            <a:ext cx="3815006" cy="4762631"/>
+            <a:off x="6443093" y="3950796"/>
+            <a:ext cx="4495800" cy="1895475"/>
           </a:xfrm>
           <a:prstGeom prst="rect">
             <a:avLst/>
@@ -7932,7 +8099,7 @@
     </p:spTree>
     <p:extLst>
       <p:ext uri="{BB962C8B-B14F-4D97-AF65-F5344CB8AC3E}">
-        <p14:creationId xmlns:p14="http://schemas.microsoft.com/office/powerpoint/2010/main" val="3960754866"/>
+        <p14:creationId xmlns:p14="http://schemas.microsoft.com/office/powerpoint/2010/main" val="291457754"/>
       </p:ext>
     </p:extLst>
   </p:cSld>
@@ -8228,6 +8395,15 @@
 </file>
 
 <file path=customXml/item2.xml><?xml version="1.0" encoding="utf-8"?>
+<?mso-contentType ?>
+<FormTemplates xmlns="http://schemas.microsoft.com/sharepoint/v3/contenttype/forms">
+  <Display>DocumentLibraryForm</Display>
+  <Edit>DocumentLibraryForm</Edit>
+  <New>DocumentLibraryForm</New>
+</FormTemplates>
+</file>
+
+<file path=customXml/item3.xml><?xml version="1.0" encoding="utf-8"?>
 <ct:contentTypeSchema xmlns:ct="http://schemas.microsoft.com/office/2006/metadata/contentType" xmlns:ma="http://schemas.microsoft.com/office/2006/metadata/properties/metaAttributes" ct:_="" ma:_="" ma:contentTypeName="Document" ma:contentTypeID="0x01010079F111ED35F8CC479449609E8A0923A6" ma:contentTypeVersion="12" ma:contentTypeDescription="Create a new document." ma:contentTypeScope="" ma:versionID="a410dd7f93c95333ffa1b60ed6adedd1">
   <xsd:schema xmlns:xsd="http://www.w3.org/2001/XMLSchema" xmlns:xs="http://www.w3.org/2001/XMLSchema" xmlns:p="http://schemas.microsoft.com/office/2006/metadata/properties" xmlns:ns2="71af3243-3dd4-4a8d-8c0d-dd76da1f02a5" xmlns:ns3="16c05727-aa75-4e4a-9b5f-8a80a1165891" targetNamespace="http://schemas.microsoft.com/office/2006/metadata/properties" ma:root="true" ma:fieldsID="a936d9baba76aa3866493feff160faab" ns2:_="" ns3:_="">
     <xsd:import namespace="71af3243-3dd4-4a8d-8c0d-dd76da1f02a5"/>
@@ -8448,15 +8624,6 @@
 </ct:contentTypeSchema>
 </file>
 
-<file path=customXml/item3.xml><?xml version="1.0" encoding="utf-8"?>
-<?mso-contentType ?>
-<FormTemplates xmlns="http://schemas.microsoft.com/sharepoint/v3/contenttype/forms">
-  <Display>DocumentLibraryForm</Display>
-  <Edit>DocumentLibraryForm</Edit>
-  <New>DocumentLibraryForm</New>
-</FormTemplates>
-</file>
-
 <file path=customXml/itemProps1.xml><?xml version="1.0" encoding="utf-8"?>
 <ds:datastoreItem xmlns:ds="http://schemas.openxmlformats.org/officeDocument/2006/customXml" ds:itemID="{137651BA-F45C-4845-9AB3-E0A65B39F5E1}">
   <ds:schemaRefs>
@@ -8468,6 +8635,14 @@
 </file>
 
 <file path=customXml/itemProps2.xml><?xml version="1.0" encoding="utf-8"?>
+<ds:datastoreItem xmlns:ds="http://schemas.openxmlformats.org/officeDocument/2006/customXml" ds:itemID="{CDB58277-F8DF-46FF-84EC-EF41B835E69F}">
+  <ds:schemaRefs>
+    <ds:schemaRef ds:uri="http://schemas.microsoft.com/sharepoint/v3/contenttype/forms"/>
+  </ds:schemaRefs>
+</ds:datastoreItem>
+</file>
+
+<file path=customXml/itemProps3.xml><?xml version="1.0" encoding="utf-8"?>
 <ds:datastoreItem xmlns:ds="http://schemas.openxmlformats.org/officeDocument/2006/customXml" ds:itemID="{2D276E62-80A3-44DD-9BCC-97ED2B99B57F}">
   <ds:schemaRefs>
     <ds:schemaRef ds:uri="http://schemas.microsoft.com/office/2006/metadata/contentType"/>
@@ -8484,12 +8659,4 @@
     <ds:schemaRef ds:uri="http://schemas.microsoft.com/internal/obd"/>
   </ds:schemaRefs>
 </ds:datastoreItem>
-</file>
-
-<file path=customXml/itemProps3.xml><?xml version="1.0" encoding="utf-8"?>
-<ds:datastoreItem xmlns:ds="http://schemas.openxmlformats.org/officeDocument/2006/customXml" ds:itemID="{CDB58277-F8DF-46FF-84EC-EF41B835E69F}">
-  <ds:schemaRefs>
-    <ds:schemaRef ds:uri="http://schemas.microsoft.com/sharepoint/v3/contenttype/forms"/>
-  </ds:schemaRefs>
-</ds:datastoreItem>
 </file>
</xml_diff>